<commit_message>
Added major oss into illustration of software framework. #667
</commit_message>
<xml_diff>
--- a/source/Overview/images_FrameworkStack/materialFrameworkStack.pptx
+++ b/source/Overview/images_FrameworkStack/materialFrameworkStack.pptx
@@ -205,7 +205,7 @@
           <a:p>
             <a:fld id="{3BB47352-BF5A-4CD2-B029-996118CD8E01}" type="datetimeFigureOut">
               <a:rPr kumimoji="1" lang="ja-JP" altLang="en-US" smtClean="0"/>
-              <a:t>2014/10/15</a:t>
+              <a:t>2014/12/20</a:t>
             </a:fld>
             <a:endParaRPr kumimoji="1" lang="ja-JP" altLang="en-US"/>
           </a:p>
@@ -854,7 +854,7 @@
           <a:p>
             <a:fld id="{7B9B12EC-6AA0-374B-A2D3-850081A07A26}" type="datetimeFigureOut">
               <a:rPr kumimoji="1" lang="ja-JP" altLang="en-US" smtClean="0"/>
-              <a:t>2014/10/15</a:t>
+              <a:t>2014/12/20</a:t>
             </a:fld>
             <a:endParaRPr kumimoji="1" lang="ja-JP" altLang="en-US"/>
           </a:p>
@@ -1056,7 +1056,7 @@
           <a:p>
             <a:fld id="{7B9B12EC-6AA0-374B-A2D3-850081A07A26}" type="datetimeFigureOut">
               <a:rPr kumimoji="1" lang="ja-JP" altLang="en-US" smtClean="0"/>
-              <a:t>2014/10/15</a:t>
+              <a:t>2014/12/20</a:t>
             </a:fld>
             <a:endParaRPr kumimoji="1" lang="ja-JP" altLang="en-US"/>
           </a:p>
@@ -1268,7 +1268,7 @@
           <a:p>
             <a:fld id="{7B9B12EC-6AA0-374B-A2D3-850081A07A26}" type="datetimeFigureOut">
               <a:rPr kumimoji="1" lang="ja-JP" altLang="en-US" smtClean="0"/>
-              <a:t>2014/10/15</a:t>
+              <a:t>2014/12/20</a:t>
             </a:fld>
             <a:endParaRPr kumimoji="1" lang="ja-JP" altLang="en-US"/>
           </a:p>
@@ -1470,7 +1470,7 @@
           <a:p>
             <a:fld id="{7B9B12EC-6AA0-374B-A2D3-850081A07A26}" type="datetimeFigureOut">
               <a:rPr kumimoji="1" lang="ja-JP" altLang="en-US" smtClean="0"/>
-              <a:t>2014/10/15</a:t>
+              <a:t>2014/12/20</a:t>
             </a:fld>
             <a:endParaRPr kumimoji="1" lang="ja-JP" altLang="en-US"/>
           </a:p>
@@ -1716,7 +1716,7 @@
           <a:p>
             <a:fld id="{7B9B12EC-6AA0-374B-A2D3-850081A07A26}" type="datetimeFigureOut">
               <a:rPr kumimoji="1" lang="ja-JP" altLang="en-US" smtClean="0"/>
-              <a:t>2014/10/15</a:t>
+              <a:t>2014/12/20</a:t>
             </a:fld>
             <a:endParaRPr kumimoji="1" lang="ja-JP" altLang="en-US"/>
           </a:p>
@@ -2068,7 +2068,7 @@
           <a:p>
             <a:fld id="{7B9B12EC-6AA0-374B-A2D3-850081A07A26}" type="datetimeFigureOut">
               <a:rPr kumimoji="1" lang="ja-JP" altLang="en-US" smtClean="0"/>
-              <a:t>2014/10/15</a:t>
+              <a:t>2014/12/20</a:t>
             </a:fld>
             <a:endParaRPr kumimoji="1" lang="ja-JP" altLang="en-US"/>
           </a:p>
@@ -2554,7 +2554,7 @@
           <a:p>
             <a:fld id="{7B9B12EC-6AA0-374B-A2D3-850081A07A26}" type="datetimeFigureOut">
               <a:rPr kumimoji="1" lang="ja-JP" altLang="en-US" smtClean="0"/>
-              <a:t>2014/10/15</a:t>
+              <a:t>2014/12/20</a:t>
             </a:fld>
             <a:endParaRPr kumimoji="1" lang="ja-JP" altLang="en-US"/>
           </a:p>
@@ -2672,7 +2672,7 @@
           <a:p>
             <a:fld id="{7B9B12EC-6AA0-374B-A2D3-850081A07A26}" type="datetimeFigureOut">
               <a:rPr kumimoji="1" lang="ja-JP" altLang="en-US" smtClean="0"/>
-              <a:t>2014/10/15</a:t>
+              <a:t>2014/12/20</a:t>
             </a:fld>
             <a:endParaRPr kumimoji="1" lang="ja-JP" altLang="en-US"/>
           </a:p>
@@ -2767,7 +2767,7 @@
           <a:p>
             <a:fld id="{7B9B12EC-6AA0-374B-A2D3-850081A07A26}" type="datetimeFigureOut">
               <a:rPr kumimoji="1" lang="ja-JP" altLang="en-US" smtClean="0"/>
-              <a:t>2014/10/15</a:t>
+              <a:t>2014/12/20</a:t>
             </a:fld>
             <a:endParaRPr kumimoji="1" lang="ja-JP" altLang="en-US"/>
           </a:p>
@@ -3076,7 +3076,7 @@
           <a:p>
             <a:fld id="{7B9B12EC-6AA0-374B-A2D3-850081A07A26}" type="datetimeFigureOut">
               <a:rPr kumimoji="1" lang="ja-JP" altLang="en-US" smtClean="0"/>
-              <a:t>2014/10/15</a:t>
+              <a:t>2014/12/20</a:t>
             </a:fld>
             <a:endParaRPr kumimoji="1" lang="ja-JP" altLang="en-US"/>
           </a:p>
@@ -3329,7 +3329,7 @@
           <a:p>
             <a:fld id="{7B9B12EC-6AA0-374B-A2D3-850081A07A26}" type="datetimeFigureOut">
               <a:rPr kumimoji="1" lang="ja-JP" altLang="en-US" smtClean="0"/>
-              <a:t>2014/10/15</a:t>
+              <a:t>2014/12/20</a:t>
             </a:fld>
             <a:endParaRPr kumimoji="1" lang="ja-JP" altLang="en-US"/>
           </a:p>
@@ -3574,7 +3574,7 @@
           <a:p>
             <a:fld id="{7B9B12EC-6AA0-374B-A2D3-850081A07A26}" type="datetimeFigureOut">
               <a:rPr kumimoji="1" lang="ja-JP" altLang="en-US" smtClean="0"/>
-              <a:t>2014/10/15</a:t>
+              <a:t>2014/12/20</a:t>
             </a:fld>
             <a:endParaRPr kumimoji="1" lang="ja-JP" altLang="en-US"/>
           </a:p>
@@ -4829,7 +4829,7 @@
   <p:timing>
     <p:tnLst>
       <p:par>
-        <p:cTn id="1" dur="indefinite" restart="never" nodeType="tmRoot"/>
+        <p:cTn xmlns:p14="http://schemas.microsoft.com/office/powerpoint/2010/main" id="1" dur="indefinite" restart="never" nodeType="tmRoot"/>
       </p:par>
     </p:tnLst>
   </p:timing>
@@ -4861,7 +4861,7 @@
         </p:nvSpPr>
         <p:spPr>
           <a:xfrm>
-            <a:off x="974790" y="3476107"/>
+            <a:off x="974790" y="2612507"/>
             <a:ext cx="1939283" cy="666749"/>
           </a:xfrm>
           <a:prstGeom prst="roundRect">
@@ -4903,7 +4903,7 @@
         </p:nvSpPr>
         <p:spPr>
           <a:xfrm>
-            <a:off x="4083925" y="3609457"/>
+            <a:off x="4083925" y="2745857"/>
             <a:ext cx="1694658" cy="666750"/>
           </a:xfrm>
           <a:prstGeom prst="roundRect">
@@ -4945,7 +4945,7 @@
         </p:nvSpPr>
         <p:spPr>
           <a:xfrm>
-            <a:off x="528589" y="2657792"/>
+            <a:off x="528589" y="1794192"/>
             <a:ext cx="2900411" cy="2313354"/>
           </a:xfrm>
           <a:prstGeom prst="roundRect">
@@ -5000,7 +5000,7 @@
         </p:nvSpPr>
         <p:spPr>
           <a:xfrm>
-            <a:off x="3848101" y="2657792"/>
+            <a:off x="3848101" y="1794192"/>
             <a:ext cx="2133600" cy="2313354"/>
           </a:xfrm>
           <a:prstGeom prst="roundRect">
@@ -5055,7 +5055,7 @@
         </p:nvSpPr>
         <p:spPr>
           <a:xfrm>
-            <a:off x="6400800" y="2657791"/>
+            <a:off x="6400800" y="1794191"/>
             <a:ext cx="2609850" cy="2313355"/>
           </a:xfrm>
           <a:prstGeom prst="roundRect">
@@ -5110,7 +5110,7 @@
         </p:nvSpPr>
         <p:spPr>
           <a:xfrm>
-            <a:off x="6653531" y="3780101"/>
+            <a:off x="6653531" y="2916501"/>
             <a:ext cx="1688784" cy="439762"/>
           </a:xfrm>
           <a:prstGeom prst="roundRect">
@@ -5152,7 +5152,7 @@
         </p:nvSpPr>
         <p:spPr>
           <a:xfrm>
-            <a:off x="687438" y="4062116"/>
+            <a:off x="687438" y="3198516"/>
             <a:ext cx="1074687" cy="504732"/>
           </a:xfrm>
           <a:prstGeom prst="roundRect">
@@ -5198,7 +5198,7 @@
         </p:nvSpPr>
         <p:spPr>
           <a:xfrm>
-            <a:off x="2077782" y="4062116"/>
+            <a:off x="2077782" y="3198516"/>
             <a:ext cx="1151193" cy="504733"/>
           </a:xfrm>
           <a:prstGeom prst="roundRect">
@@ -5246,7 +5246,7 @@
         </p:nvSpPr>
         <p:spPr>
           <a:xfrm>
-            <a:off x="974790" y="1571143"/>
+            <a:off x="974790" y="707543"/>
             <a:ext cx="1939283" cy="458887"/>
           </a:xfrm>
           <a:prstGeom prst="roundRect">
@@ -5288,7 +5288,7 @@
         </p:nvSpPr>
         <p:spPr>
           <a:xfrm>
-            <a:off x="528589" y="1060845"/>
+            <a:off x="528589" y="197245"/>
             <a:ext cx="2900412" cy="1211824"/>
           </a:xfrm>
           <a:prstGeom prst="roundRect">
@@ -5353,7 +5353,7 @@
         </p:nvSpPr>
         <p:spPr>
           <a:xfrm>
-            <a:off x="6653530" y="3182226"/>
+            <a:off x="6653530" y="2318626"/>
             <a:ext cx="1688785" cy="439762"/>
           </a:xfrm>
           <a:prstGeom prst="roundRect">
@@ -5398,7 +5398,7 @@
         </p:nvCxnSpPr>
         <p:spPr>
           <a:xfrm>
-            <a:off x="76198" y="1666757"/>
+            <a:off x="76198" y="803157"/>
             <a:ext cx="452391" cy="0"/>
           </a:xfrm>
           <a:prstGeom prst="straightConnector1">
@@ -5441,7 +5441,7 @@
         </p:nvCxnSpPr>
         <p:spPr>
           <a:xfrm flipV="1">
-            <a:off x="1978795" y="2272669"/>
+            <a:off x="1978795" y="1409069"/>
             <a:ext cx="0" cy="385123"/>
           </a:xfrm>
           <a:prstGeom prst="straightConnector1">
@@ -5481,7 +5481,7 @@
         </p:nvSpPr>
         <p:spPr>
           <a:xfrm>
-            <a:off x="6663056" y="4362738"/>
+            <a:off x="6663056" y="3499138"/>
             <a:ext cx="1679259" cy="439762"/>
           </a:xfrm>
           <a:prstGeom prst="roundRect">
@@ -5523,8 +5523,8 @@
         </p:nvSpPr>
         <p:spPr>
           <a:xfrm>
-            <a:off x="528589" y="5133563"/>
-            <a:ext cx="8482062" cy="737329"/>
+            <a:off x="528589" y="5895563"/>
+            <a:ext cx="8482062" cy="873537"/>
           </a:xfrm>
           <a:prstGeom prst="roundRect">
             <a:avLst/>
@@ -5567,7 +5567,7 @@
           <a:p>
             <a:pPr algn="ctr"/>
             <a:r>
-              <a:rPr kumimoji="1" lang="en-US" altLang="ja-JP" sz="2400" dirty="0" smtClean="0">
+              <a:rPr kumimoji="1" lang="en-US" altLang="ja-JP" sz="2800" dirty="0" smtClean="0">
                 <a:solidFill>
                   <a:schemeClr val="bg1"/>
                 </a:solidFill>
@@ -5578,14 +5578,14 @@
           <a:p>
             <a:pPr algn="ctr"/>
             <a:r>
-              <a:rPr kumimoji="1" lang="en-US" altLang="ja-JP" sz="2400" dirty="0" smtClean="0">
+              <a:rPr kumimoji="1" lang="en-US" altLang="ja-JP" sz="2800" dirty="0" smtClean="0">
                 <a:solidFill>
                   <a:schemeClr val="bg1"/>
                 </a:solidFill>
               </a:rPr>
               <a:t>(DI , AOP …)</a:t>
             </a:r>
-            <a:endParaRPr kumimoji="1" lang="ja-JP" altLang="en-US" sz="2400" dirty="0">
+            <a:endParaRPr kumimoji="1" lang="ja-JP" altLang="en-US" sz="2800" dirty="0">
               <a:solidFill>
                 <a:schemeClr val="bg1"/>
               </a:solidFill>
@@ -5604,7 +5604,7 @@
         </p:nvCxnSpPr>
         <p:spPr>
           <a:xfrm>
-            <a:off x="3429000" y="3814469"/>
+            <a:off x="3429000" y="2950869"/>
             <a:ext cx="419101" cy="0"/>
           </a:xfrm>
           <a:prstGeom prst="straightConnector1">
@@ -5647,7 +5647,7 @@
         </p:nvCxnSpPr>
         <p:spPr>
           <a:xfrm>
-            <a:off x="5981701" y="3814469"/>
+            <a:off x="5981701" y="2950869"/>
             <a:ext cx="419099" cy="0"/>
           </a:xfrm>
           <a:prstGeom prst="straightConnector1">
@@ -5687,7 +5687,7 @@
         </p:nvSpPr>
         <p:spPr>
           <a:xfrm>
-            <a:off x="8280248" y="3384809"/>
+            <a:off x="8280248" y="2521209"/>
             <a:ext cx="539593" cy="334987"/>
           </a:xfrm>
           <a:prstGeom prst="roundRect">
@@ -5729,7 +5729,7 @@
         </p:nvSpPr>
         <p:spPr>
           <a:xfrm>
-            <a:off x="-1540169" y="1333382"/>
+            <a:off x="-1540169" y="469782"/>
             <a:ext cx="1616367" cy="666750"/>
           </a:xfrm>
           <a:prstGeom prst="rect">
@@ -5792,7 +5792,7 @@
         </p:nvSpPr>
         <p:spPr>
           <a:xfrm>
-            <a:off x="9126109" y="1321893"/>
+            <a:off x="9126109" y="458293"/>
             <a:ext cx="1495425" cy="670037"/>
           </a:xfrm>
           <a:prstGeom prst="flowChartMagneticDisk">
@@ -5837,10 +5837,827 @@
         </p:nvCxnSpPr>
         <p:spPr>
           <a:xfrm rot="5400000" flipH="1" flipV="1">
-            <a:off x="7915478" y="1447160"/>
+            <a:off x="7915478" y="583560"/>
             <a:ext cx="1000879" cy="1420384"/>
           </a:xfrm>
           <a:prstGeom prst="bentConnector2">
+            <a:avLst/>
+          </a:prstGeom>
+          <a:ln>
+            <a:solidFill>
+              <a:schemeClr val="tx1">
+                <a:lumMod val="50000"/>
+                <a:lumOff val="50000"/>
+              </a:schemeClr>
+            </a:solidFill>
+            <a:headEnd type="arrow"/>
+            <a:tailEnd type="arrow"/>
+          </a:ln>
+        </p:spPr>
+        <p:style>
+          <a:lnRef idx="2">
+            <a:schemeClr val="accent1"/>
+          </a:lnRef>
+          <a:fillRef idx="0">
+            <a:schemeClr val="accent1"/>
+          </a:fillRef>
+          <a:effectRef idx="1">
+            <a:schemeClr val="accent1"/>
+          </a:effectRef>
+          <a:fontRef idx="minor">
+            <a:schemeClr val="tx1"/>
+          </a:fontRef>
+        </p:style>
+      </p:cxnSp>
+      <p:sp>
+        <p:nvSpPr>
+          <p:cNvPr id="23" name="角丸四角形 22"/>
+          <p:cNvSpPr/>
+          <p:nvPr/>
+        </p:nvSpPr>
+        <p:spPr>
+          <a:xfrm>
+            <a:off x="557165" y="4488546"/>
+            <a:ext cx="8453485" cy="1277254"/>
+          </a:xfrm>
+          <a:prstGeom prst="roundRect">
+            <a:avLst/>
+          </a:prstGeom>
+          <a:noFill/>
+          <a:ln>
+            <a:solidFill>
+              <a:schemeClr val="tx1">
+                <a:lumMod val="50000"/>
+                <a:lumOff val="50000"/>
+              </a:schemeClr>
+            </a:solidFill>
+          </a:ln>
+        </p:spPr>
+        <p:style>
+          <a:lnRef idx="2">
+            <a:schemeClr val="accent1"/>
+          </a:lnRef>
+          <a:fillRef idx="1">
+            <a:schemeClr val="lt1"/>
+          </a:fillRef>
+          <a:effectRef idx="0">
+            <a:schemeClr val="accent1"/>
+          </a:effectRef>
+          <a:fontRef idx="minor">
+            <a:schemeClr val="dk1"/>
+          </a:fontRef>
+        </p:style>
+        <p:txBody>
+          <a:bodyPr rtlCol="0" anchor="t"/>
+          <a:lstStyle/>
+          <a:p>
+            <a:pPr algn="ctr"/>
+            <a:r>
+              <a:rPr lang="en-US" altLang="ja-JP" sz="2000" b="1" dirty="0" smtClean="0">
+                <a:solidFill>
+                  <a:schemeClr val="tx1">
+                    <a:lumMod val="65000"/>
+                    <a:lumOff val="35000"/>
+                  </a:schemeClr>
+                </a:solidFill>
+              </a:rPr>
+              <a:t>Useful OSS Libraries</a:t>
+            </a:r>
+            <a:endParaRPr kumimoji="1" lang="ja-JP" altLang="en-US" sz="2000" b="1" dirty="0">
+              <a:solidFill>
+                <a:schemeClr val="tx1">
+                  <a:lumMod val="65000"/>
+                  <a:lumOff val="35000"/>
+                </a:schemeClr>
+              </a:solidFill>
+            </a:endParaRPr>
+          </a:p>
+        </p:txBody>
+      </p:sp>
+      <p:sp>
+        <p:nvSpPr>
+          <p:cNvPr id="24" name="角丸四角形 23"/>
+          <p:cNvSpPr/>
+          <p:nvPr/>
+        </p:nvSpPr>
+        <p:spPr>
+          <a:xfrm>
+            <a:off x="7576272" y="5019784"/>
+            <a:ext cx="1306351" cy="504733"/>
+          </a:xfrm>
+          <a:prstGeom prst="roundRect">
+            <a:avLst/>
+          </a:prstGeom>
+          <a:gradFill>
+            <a:gsLst>
+              <a:gs pos="0">
+                <a:schemeClr val="bg1">
+                  <a:lumMod val="75000"/>
+                </a:schemeClr>
+              </a:gs>
+              <a:gs pos="100000">
+                <a:schemeClr val="bg1">
+                  <a:lumMod val="95000"/>
+                </a:schemeClr>
+              </a:gs>
+            </a:gsLst>
+          </a:gradFill>
+        </p:spPr>
+        <p:style>
+          <a:lnRef idx="1">
+            <a:schemeClr val="dk1"/>
+          </a:lnRef>
+          <a:fillRef idx="3">
+            <a:schemeClr val="dk1"/>
+          </a:fillRef>
+          <a:effectRef idx="2">
+            <a:schemeClr val="dk1"/>
+          </a:effectRef>
+          <a:fontRef idx="minor">
+            <a:schemeClr val="lt1"/>
+          </a:fontRef>
+        </p:style>
+        <p:txBody>
+          <a:bodyPr rtlCol="0" anchor="ctr"/>
+          <a:lstStyle/>
+          <a:p>
+            <a:pPr algn="ctr"/>
+            <a:r>
+              <a:rPr kumimoji="1" lang="en-US" altLang="ja-JP" sz="1600" dirty="0" smtClean="0">
+                <a:solidFill>
+                  <a:schemeClr val="tx1">
+                    <a:lumMod val="75000"/>
+                    <a:lumOff val="25000"/>
+                  </a:schemeClr>
+                </a:solidFill>
+              </a:rPr>
+              <a:t>Common</a:t>
+            </a:r>
+          </a:p>
+          <a:p>
+            <a:pPr algn="ctr"/>
+            <a:r>
+              <a:rPr lang="en-US" altLang="ja-JP" sz="1600" dirty="0" smtClean="0">
+                <a:solidFill>
+                  <a:schemeClr val="tx1">
+                    <a:lumMod val="75000"/>
+                    <a:lumOff val="25000"/>
+                  </a:schemeClr>
+                </a:solidFill>
+              </a:rPr>
+              <a:t>Library</a:t>
+            </a:r>
+            <a:endParaRPr kumimoji="1" lang="en-US" altLang="ja-JP" sz="1600" dirty="0" smtClean="0">
+              <a:solidFill>
+                <a:schemeClr val="tx1">
+                  <a:lumMod val="75000"/>
+                  <a:lumOff val="25000"/>
+                </a:schemeClr>
+              </a:solidFill>
+            </a:endParaRPr>
+          </a:p>
+        </p:txBody>
+      </p:sp>
+      <p:sp>
+        <p:nvSpPr>
+          <p:cNvPr id="25" name="角丸四角形 24"/>
+          <p:cNvSpPr/>
+          <p:nvPr/>
+        </p:nvSpPr>
+        <p:spPr>
+          <a:xfrm>
+            <a:off x="742689" y="5019784"/>
+            <a:ext cx="1198005" cy="504733"/>
+          </a:xfrm>
+          <a:prstGeom prst="roundRect">
+            <a:avLst/>
+          </a:prstGeom>
+          <a:gradFill>
+            <a:gsLst>
+              <a:gs pos="0">
+                <a:schemeClr val="bg1">
+                  <a:lumMod val="75000"/>
+                </a:schemeClr>
+              </a:gs>
+              <a:gs pos="100000">
+                <a:schemeClr val="bg1">
+                  <a:lumMod val="95000"/>
+                </a:schemeClr>
+              </a:gs>
+            </a:gsLst>
+          </a:gradFill>
+        </p:spPr>
+        <p:style>
+          <a:lnRef idx="1">
+            <a:schemeClr val="dk1"/>
+          </a:lnRef>
+          <a:fillRef idx="3">
+            <a:schemeClr val="dk1"/>
+          </a:fillRef>
+          <a:effectRef idx="2">
+            <a:schemeClr val="dk1"/>
+          </a:effectRef>
+          <a:fontRef idx="minor">
+            <a:schemeClr val="lt1"/>
+          </a:fontRef>
+        </p:style>
+        <p:txBody>
+          <a:bodyPr rtlCol="0" anchor="ctr"/>
+          <a:lstStyle/>
+          <a:p>
+            <a:pPr algn="ctr"/>
+            <a:r>
+              <a:rPr kumimoji="1" lang="en-US" altLang="ja-JP" sz="1600" dirty="0" smtClean="0">
+                <a:solidFill>
+                  <a:schemeClr val="tx1">
+                    <a:lumMod val="75000"/>
+                    <a:lumOff val="25000"/>
+                  </a:schemeClr>
+                </a:solidFill>
+              </a:rPr>
+              <a:t>SLF4J</a:t>
+            </a:r>
+          </a:p>
+        </p:txBody>
+      </p:sp>
+      <p:sp>
+        <p:nvSpPr>
+          <p:cNvPr id="29" name="角丸四角形 28"/>
+          <p:cNvSpPr/>
+          <p:nvPr/>
+        </p:nvSpPr>
+        <p:spPr>
+          <a:xfrm>
+            <a:off x="2039682" y="5019784"/>
+            <a:ext cx="1177624" cy="504733"/>
+          </a:xfrm>
+          <a:prstGeom prst="roundRect">
+            <a:avLst/>
+          </a:prstGeom>
+          <a:gradFill>
+            <a:gsLst>
+              <a:gs pos="0">
+                <a:schemeClr val="bg1">
+                  <a:lumMod val="75000"/>
+                </a:schemeClr>
+              </a:gs>
+              <a:gs pos="100000">
+                <a:schemeClr val="bg1">
+                  <a:lumMod val="95000"/>
+                </a:schemeClr>
+              </a:gs>
+            </a:gsLst>
+          </a:gradFill>
+        </p:spPr>
+        <p:style>
+          <a:lnRef idx="1">
+            <a:schemeClr val="dk1"/>
+          </a:lnRef>
+          <a:fillRef idx="3">
+            <a:schemeClr val="dk1"/>
+          </a:fillRef>
+          <a:effectRef idx="2">
+            <a:schemeClr val="dk1"/>
+          </a:effectRef>
+          <a:fontRef idx="minor">
+            <a:schemeClr val="lt1"/>
+          </a:fontRef>
+        </p:style>
+        <p:txBody>
+          <a:bodyPr rtlCol="0" anchor="ctr"/>
+          <a:lstStyle/>
+          <a:p>
+            <a:pPr algn="ctr"/>
+            <a:r>
+              <a:rPr lang="en-US" altLang="ja-JP" sz="1600" dirty="0" smtClean="0">
+                <a:solidFill>
+                  <a:schemeClr val="tx1">
+                    <a:lumMod val="75000"/>
+                    <a:lumOff val="25000"/>
+                  </a:schemeClr>
+                </a:solidFill>
+              </a:rPr>
+              <a:t>Dozer</a:t>
+            </a:r>
+            <a:endParaRPr kumimoji="1" lang="en-US" altLang="ja-JP" sz="1600" dirty="0" smtClean="0">
+              <a:solidFill>
+                <a:schemeClr val="tx1">
+                  <a:lumMod val="75000"/>
+                  <a:lumOff val="25000"/>
+                </a:schemeClr>
+              </a:solidFill>
+            </a:endParaRPr>
+          </a:p>
+        </p:txBody>
+      </p:sp>
+      <p:sp>
+        <p:nvSpPr>
+          <p:cNvPr id="30" name="角丸四角形 29"/>
+          <p:cNvSpPr/>
+          <p:nvPr/>
+        </p:nvSpPr>
+        <p:spPr>
+          <a:xfrm>
+            <a:off x="3327400" y="5019784"/>
+            <a:ext cx="1177624" cy="504733"/>
+          </a:xfrm>
+          <a:prstGeom prst="roundRect">
+            <a:avLst/>
+          </a:prstGeom>
+          <a:gradFill>
+            <a:gsLst>
+              <a:gs pos="0">
+                <a:schemeClr val="bg1">
+                  <a:lumMod val="75000"/>
+                </a:schemeClr>
+              </a:gs>
+              <a:gs pos="100000">
+                <a:schemeClr val="bg1">
+                  <a:lumMod val="95000"/>
+                </a:schemeClr>
+              </a:gs>
+            </a:gsLst>
+          </a:gradFill>
+        </p:spPr>
+        <p:style>
+          <a:lnRef idx="1">
+            <a:schemeClr val="dk1"/>
+          </a:lnRef>
+          <a:fillRef idx="3">
+            <a:schemeClr val="dk1"/>
+          </a:fillRef>
+          <a:effectRef idx="2">
+            <a:schemeClr val="dk1"/>
+          </a:effectRef>
+          <a:fontRef idx="minor">
+            <a:schemeClr val="lt1"/>
+          </a:fontRef>
+        </p:style>
+        <p:txBody>
+          <a:bodyPr rtlCol="0" anchor="ctr"/>
+          <a:lstStyle/>
+          <a:p>
+            <a:pPr algn="ctr"/>
+            <a:r>
+              <a:rPr lang="en-US" altLang="ja-JP" sz="1600" dirty="0" smtClean="0">
+                <a:solidFill>
+                  <a:schemeClr val="tx1">
+                    <a:lumMod val="75000"/>
+                    <a:lumOff val="25000"/>
+                  </a:schemeClr>
+                </a:solidFill>
+              </a:rPr>
+              <a:t>Jackson</a:t>
+            </a:r>
+            <a:endParaRPr kumimoji="1" lang="en-US" altLang="ja-JP" sz="1600" dirty="0" smtClean="0">
+              <a:solidFill>
+                <a:schemeClr val="tx1">
+                  <a:lumMod val="75000"/>
+                  <a:lumOff val="25000"/>
+                </a:schemeClr>
+              </a:solidFill>
+            </a:endParaRPr>
+          </a:p>
+        </p:txBody>
+      </p:sp>
+      <p:sp>
+        <p:nvSpPr>
+          <p:cNvPr id="31" name="角丸四角形 30"/>
+          <p:cNvSpPr/>
+          <p:nvPr/>
+        </p:nvSpPr>
+        <p:spPr>
+          <a:xfrm>
+            <a:off x="6129886" y="4946868"/>
+            <a:ext cx="990139" cy="504733"/>
+          </a:xfrm>
+          <a:prstGeom prst="roundRect">
+            <a:avLst/>
+          </a:prstGeom>
+          <a:gradFill>
+            <a:gsLst>
+              <a:gs pos="0">
+                <a:schemeClr val="bg1">
+                  <a:lumMod val="75000"/>
+                </a:schemeClr>
+              </a:gs>
+              <a:gs pos="100000">
+                <a:schemeClr val="bg1">
+                  <a:lumMod val="95000"/>
+                </a:schemeClr>
+              </a:gs>
+            </a:gsLst>
+          </a:gradFill>
+        </p:spPr>
+        <p:style>
+          <a:lnRef idx="1">
+            <a:schemeClr val="dk1"/>
+          </a:lnRef>
+          <a:fillRef idx="3">
+            <a:schemeClr val="dk1"/>
+          </a:fillRef>
+          <a:effectRef idx="2">
+            <a:schemeClr val="dk1"/>
+          </a:effectRef>
+          <a:fontRef idx="minor">
+            <a:schemeClr val="lt1"/>
+          </a:fontRef>
+        </p:style>
+        <p:txBody>
+          <a:bodyPr rtlCol="0" anchor="ctr"/>
+          <a:lstStyle/>
+          <a:p>
+            <a:pPr algn="ctr"/>
+            <a:r>
+              <a:rPr lang="en-US" altLang="ja-JP" sz="1600" dirty="0">
+                <a:solidFill>
+                  <a:schemeClr val="tx1">
+                    <a:lumMod val="75000"/>
+                    <a:lumOff val="25000"/>
+                  </a:schemeClr>
+                </a:solidFill>
+              </a:rPr>
+              <a:t>m</a:t>
+            </a:r>
+            <a:r>
+              <a:rPr lang="en-US" altLang="ja-JP" sz="1600" dirty="0" smtClean="0">
+                <a:solidFill>
+                  <a:schemeClr val="tx1">
+                    <a:lumMod val="75000"/>
+                    <a:lumOff val="25000"/>
+                  </a:schemeClr>
+                </a:solidFill>
+              </a:rPr>
+              <a:t>ore </a:t>
+            </a:r>
+            <a:r>
+              <a:rPr kumimoji="1" lang="en-US" altLang="ja-JP" sz="1600" dirty="0" smtClean="0">
+                <a:solidFill>
+                  <a:schemeClr val="tx1">
+                    <a:lumMod val="75000"/>
+                    <a:lumOff val="25000"/>
+                  </a:schemeClr>
+                </a:solidFill>
+              </a:rPr>
+              <a:t>…</a:t>
+            </a:r>
+            <a:endParaRPr kumimoji="1" lang="en-US" altLang="ja-JP" sz="1600" dirty="0" smtClean="0">
+              <a:solidFill>
+                <a:schemeClr val="tx1">
+                  <a:lumMod val="75000"/>
+                  <a:lumOff val="25000"/>
+                </a:schemeClr>
+              </a:solidFill>
+            </a:endParaRPr>
+          </a:p>
+        </p:txBody>
+      </p:sp>
+      <p:sp>
+        <p:nvSpPr>
+          <p:cNvPr id="32" name="角丸四角形 31"/>
+          <p:cNvSpPr/>
+          <p:nvPr/>
+        </p:nvSpPr>
+        <p:spPr>
+          <a:xfrm>
+            <a:off x="4648201" y="5019784"/>
+            <a:ext cx="1371600" cy="504733"/>
+          </a:xfrm>
+          <a:prstGeom prst="roundRect">
+            <a:avLst/>
+          </a:prstGeom>
+          <a:gradFill>
+            <a:gsLst>
+              <a:gs pos="0">
+                <a:schemeClr val="bg1">
+                  <a:lumMod val="75000"/>
+                </a:schemeClr>
+              </a:gs>
+              <a:gs pos="100000">
+                <a:schemeClr val="bg1">
+                  <a:lumMod val="95000"/>
+                </a:schemeClr>
+              </a:gs>
+            </a:gsLst>
+          </a:gradFill>
+        </p:spPr>
+        <p:style>
+          <a:lnRef idx="1">
+            <a:schemeClr val="dk1"/>
+          </a:lnRef>
+          <a:fillRef idx="3">
+            <a:schemeClr val="dk1"/>
+          </a:fillRef>
+          <a:effectRef idx="2">
+            <a:schemeClr val="dk1"/>
+          </a:effectRef>
+          <a:fontRef idx="minor">
+            <a:schemeClr val="lt1"/>
+          </a:fontRef>
+        </p:style>
+        <p:txBody>
+          <a:bodyPr rtlCol="0" anchor="ctr"/>
+          <a:lstStyle/>
+          <a:p>
+            <a:pPr algn="ctr"/>
+            <a:r>
+              <a:rPr lang="en-US" altLang="ja-JP" sz="1600" dirty="0" smtClean="0">
+                <a:solidFill>
+                  <a:schemeClr val="tx1">
+                    <a:lumMod val="75000"/>
+                    <a:lumOff val="25000"/>
+                  </a:schemeClr>
+                </a:solidFill>
+              </a:rPr>
+              <a:t>Spring Data Commons</a:t>
+            </a:r>
+            <a:endParaRPr kumimoji="1" lang="en-US" altLang="ja-JP" sz="1600" dirty="0" smtClean="0">
+              <a:solidFill>
+                <a:schemeClr val="tx1">
+                  <a:lumMod val="75000"/>
+                  <a:lumOff val="25000"/>
+                </a:schemeClr>
+              </a:solidFill>
+            </a:endParaRPr>
+          </a:p>
+        </p:txBody>
+      </p:sp>
+      <p:sp>
+        <p:nvSpPr>
+          <p:cNvPr id="33" name="角丸四角形 32"/>
+          <p:cNvSpPr/>
+          <p:nvPr/>
+        </p:nvSpPr>
+        <p:spPr>
+          <a:xfrm>
+            <a:off x="6256886" y="5023068"/>
+            <a:ext cx="990139" cy="504733"/>
+          </a:xfrm>
+          <a:prstGeom prst="roundRect">
+            <a:avLst/>
+          </a:prstGeom>
+          <a:gradFill>
+            <a:gsLst>
+              <a:gs pos="0">
+                <a:schemeClr val="bg1">
+                  <a:lumMod val="75000"/>
+                </a:schemeClr>
+              </a:gs>
+              <a:gs pos="100000">
+                <a:schemeClr val="bg1">
+                  <a:lumMod val="95000"/>
+                </a:schemeClr>
+              </a:gs>
+            </a:gsLst>
+          </a:gradFill>
+        </p:spPr>
+        <p:style>
+          <a:lnRef idx="1">
+            <a:schemeClr val="dk1"/>
+          </a:lnRef>
+          <a:fillRef idx="3">
+            <a:schemeClr val="dk1"/>
+          </a:fillRef>
+          <a:effectRef idx="2">
+            <a:schemeClr val="dk1"/>
+          </a:effectRef>
+          <a:fontRef idx="minor">
+            <a:schemeClr val="lt1"/>
+          </a:fontRef>
+        </p:style>
+        <p:txBody>
+          <a:bodyPr rtlCol="0" anchor="ctr"/>
+          <a:lstStyle/>
+          <a:p>
+            <a:pPr algn="ctr"/>
+            <a:r>
+              <a:rPr lang="en-US" altLang="ja-JP" sz="1600" dirty="0">
+                <a:solidFill>
+                  <a:schemeClr val="tx1">
+                    <a:lumMod val="75000"/>
+                    <a:lumOff val="25000"/>
+                  </a:schemeClr>
+                </a:solidFill>
+              </a:rPr>
+              <a:t>m</a:t>
+            </a:r>
+            <a:r>
+              <a:rPr lang="en-US" altLang="ja-JP" sz="1600" dirty="0" smtClean="0">
+                <a:solidFill>
+                  <a:schemeClr val="tx1">
+                    <a:lumMod val="75000"/>
+                    <a:lumOff val="25000"/>
+                  </a:schemeClr>
+                </a:solidFill>
+              </a:rPr>
+              <a:t>ore </a:t>
+            </a:r>
+            <a:r>
+              <a:rPr kumimoji="1" lang="en-US" altLang="ja-JP" sz="1600" dirty="0" smtClean="0">
+                <a:solidFill>
+                  <a:schemeClr val="tx1">
+                    <a:lumMod val="75000"/>
+                    <a:lumOff val="25000"/>
+                  </a:schemeClr>
+                </a:solidFill>
+              </a:rPr>
+              <a:t>…</a:t>
+            </a:r>
+            <a:endParaRPr kumimoji="1" lang="en-US" altLang="ja-JP" sz="1600" dirty="0" smtClean="0">
+              <a:solidFill>
+                <a:schemeClr val="tx1">
+                  <a:lumMod val="75000"/>
+                  <a:lumOff val="25000"/>
+                </a:schemeClr>
+              </a:solidFill>
+            </a:endParaRPr>
+          </a:p>
+        </p:txBody>
+      </p:sp>
+      <p:sp>
+        <p:nvSpPr>
+          <p:cNvPr id="36" name="角丸四角形 35"/>
+          <p:cNvSpPr/>
+          <p:nvPr/>
+        </p:nvSpPr>
+        <p:spPr>
+          <a:xfrm>
+            <a:off x="6409286" y="5111968"/>
+            <a:ext cx="990139" cy="504733"/>
+          </a:xfrm>
+          <a:prstGeom prst="roundRect">
+            <a:avLst/>
+          </a:prstGeom>
+          <a:gradFill>
+            <a:gsLst>
+              <a:gs pos="0">
+                <a:schemeClr val="bg1">
+                  <a:lumMod val="75000"/>
+                </a:schemeClr>
+              </a:gs>
+              <a:gs pos="100000">
+                <a:schemeClr val="bg1">
+                  <a:lumMod val="95000"/>
+                </a:schemeClr>
+              </a:gs>
+            </a:gsLst>
+          </a:gradFill>
+        </p:spPr>
+        <p:style>
+          <a:lnRef idx="1">
+            <a:schemeClr val="dk1"/>
+          </a:lnRef>
+          <a:fillRef idx="3">
+            <a:schemeClr val="dk1"/>
+          </a:fillRef>
+          <a:effectRef idx="2">
+            <a:schemeClr val="dk1"/>
+          </a:effectRef>
+          <a:fontRef idx="minor">
+            <a:schemeClr val="lt1"/>
+          </a:fontRef>
+        </p:style>
+        <p:txBody>
+          <a:bodyPr rtlCol="0" anchor="ctr"/>
+          <a:lstStyle/>
+          <a:p>
+            <a:pPr algn="ctr"/>
+            <a:r>
+              <a:rPr lang="en-US" altLang="ja-JP" sz="1600" dirty="0">
+                <a:solidFill>
+                  <a:schemeClr val="tx1">
+                    <a:lumMod val="75000"/>
+                    <a:lumOff val="25000"/>
+                  </a:schemeClr>
+                </a:solidFill>
+              </a:rPr>
+              <a:t>m</a:t>
+            </a:r>
+            <a:r>
+              <a:rPr lang="en-US" altLang="ja-JP" sz="1600" dirty="0" smtClean="0">
+                <a:solidFill>
+                  <a:schemeClr val="tx1">
+                    <a:lumMod val="75000"/>
+                    <a:lumOff val="25000"/>
+                  </a:schemeClr>
+                </a:solidFill>
+              </a:rPr>
+              <a:t>ore </a:t>
+            </a:r>
+            <a:r>
+              <a:rPr kumimoji="1" lang="en-US" altLang="ja-JP" sz="1600" dirty="0" smtClean="0">
+                <a:solidFill>
+                  <a:schemeClr val="tx1">
+                    <a:lumMod val="75000"/>
+                    <a:lumOff val="25000"/>
+                  </a:schemeClr>
+                </a:solidFill>
+              </a:rPr>
+              <a:t>…</a:t>
+            </a:r>
+            <a:endParaRPr kumimoji="1" lang="en-US" altLang="ja-JP" sz="1600" dirty="0" smtClean="0">
+              <a:solidFill>
+                <a:schemeClr val="tx1">
+                  <a:lumMod val="75000"/>
+                  <a:lumOff val="25000"/>
+                </a:schemeClr>
+              </a:solidFill>
+            </a:endParaRPr>
+          </a:p>
+        </p:txBody>
+      </p:sp>
+      <p:cxnSp>
+        <p:nvCxnSpPr>
+          <p:cNvPr id="37" name="直線矢印コネクタ 36"/>
+          <p:cNvCxnSpPr/>
+          <p:nvPr/>
+        </p:nvCxnSpPr>
+        <p:spPr>
+          <a:xfrm>
+            <a:off x="1978795" y="4095769"/>
+            <a:ext cx="0" cy="392777"/>
+          </a:xfrm>
+          <a:prstGeom prst="straightConnector1">
+            <a:avLst/>
+          </a:prstGeom>
+          <a:ln>
+            <a:solidFill>
+              <a:schemeClr val="tx1">
+                <a:lumMod val="50000"/>
+                <a:lumOff val="50000"/>
+              </a:schemeClr>
+            </a:solidFill>
+            <a:headEnd type="arrow"/>
+            <a:tailEnd type="arrow"/>
+          </a:ln>
+        </p:spPr>
+        <p:style>
+          <a:lnRef idx="2">
+            <a:schemeClr val="accent1"/>
+          </a:lnRef>
+          <a:fillRef idx="0">
+            <a:schemeClr val="accent1"/>
+          </a:fillRef>
+          <a:effectRef idx="1">
+            <a:schemeClr val="accent1"/>
+          </a:effectRef>
+          <a:fontRef idx="minor">
+            <a:schemeClr val="tx1"/>
+          </a:fontRef>
+        </p:style>
+      </p:cxnSp>
+      <p:cxnSp>
+        <p:nvCxnSpPr>
+          <p:cNvPr id="43" name="直線矢印コネクタ 42"/>
+          <p:cNvCxnSpPr/>
+          <p:nvPr/>
+        </p:nvCxnSpPr>
+        <p:spPr>
+          <a:xfrm>
+            <a:off x="4912495" y="4107546"/>
+            <a:ext cx="0" cy="392777"/>
+          </a:xfrm>
+          <a:prstGeom prst="straightConnector1">
+            <a:avLst/>
+          </a:prstGeom>
+          <a:ln>
+            <a:solidFill>
+              <a:schemeClr val="tx1">
+                <a:lumMod val="50000"/>
+                <a:lumOff val="50000"/>
+              </a:schemeClr>
+            </a:solidFill>
+            <a:headEnd type="arrow"/>
+            <a:tailEnd type="arrow"/>
+          </a:ln>
+        </p:spPr>
+        <p:style>
+          <a:lnRef idx="2">
+            <a:schemeClr val="accent1"/>
+          </a:lnRef>
+          <a:fillRef idx="0">
+            <a:schemeClr val="accent1"/>
+          </a:fillRef>
+          <a:effectRef idx="1">
+            <a:schemeClr val="accent1"/>
+          </a:effectRef>
+          <a:fontRef idx="minor">
+            <a:schemeClr val="tx1"/>
+          </a:fontRef>
+        </p:style>
+      </p:cxnSp>
+      <p:cxnSp>
+        <p:nvCxnSpPr>
+          <p:cNvPr id="45" name="直線矢印コネクタ 44"/>
+          <p:cNvCxnSpPr/>
+          <p:nvPr/>
+        </p:nvCxnSpPr>
+        <p:spPr>
+          <a:xfrm>
+            <a:off x="7705725" y="4107546"/>
+            <a:ext cx="0" cy="392777"/>
+          </a:xfrm>
+          <a:prstGeom prst="straightConnector1">
             <a:avLst/>
           </a:prstGeom>
           <a:ln>
@@ -5882,7 +6699,7 @@
   <p:timing>
     <p:tnLst>
       <p:par>
-        <p:cTn id="1" dur="indefinite" restart="never" nodeType="tmRoot"/>
+        <p:cTn xmlns:p14="http://schemas.microsoft.com/office/powerpoint/2010/main" id="1" dur="indefinite" restart="never" nodeType="tmRoot"/>
       </p:par>
     </p:tnLst>
   </p:timing>

</xml_diff>

<commit_message>
Improve explanation of data access. #837
* Move chapter about MyBatis2 to Appendix & change to deprecated
* Change order of explanation of data access (MyBatis3 -> JPA -> MyBatis2)
* Move explanation of exclusion control for MyBatis2 from ExclusionControl.rst to DataAccessMyBatis2.rst
* Move explanation of Repository for MyBatis2 from InfrastructureLater.rst to DataAccessMyBatis2.rst
</commit_message>
<xml_diff>
--- a/source/Overview/images_FrameworkStack/materialFrameworkStack.pptx
+++ b/source/Overview/images_FrameworkStack/materialFrameworkStack.pptx
@@ -205,7 +205,7 @@
           <a:p>
             <a:fld id="{3BB47352-BF5A-4CD2-B029-996118CD8E01}" type="datetimeFigureOut">
               <a:rPr kumimoji="1" lang="ja-JP" altLang="en-US" smtClean="0"/>
-              <a:t>2014/12/20</a:t>
+              <a:t>2015/02/10</a:t>
             </a:fld>
             <a:endParaRPr kumimoji="1" lang="ja-JP" altLang="en-US"/>
           </a:p>
@@ -854,7 +854,7 @@
           <a:p>
             <a:fld id="{7B9B12EC-6AA0-374B-A2D3-850081A07A26}" type="datetimeFigureOut">
               <a:rPr kumimoji="1" lang="ja-JP" altLang="en-US" smtClean="0"/>
-              <a:t>2014/12/20</a:t>
+              <a:t>2015/02/10</a:t>
             </a:fld>
             <a:endParaRPr kumimoji="1" lang="ja-JP" altLang="en-US"/>
           </a:p>
@@ -1056,7 +1056,7 @@
           <a:p>
             <a:fld id="{7B9B12EC-6AA0-374B-A2D3-850081A07A26}" type="datetimeFigureOut">
               <a:rPr kumimoji="1" lang="ja-JP" altLang="en-US" smtClean="0"/>
-              <a:t>2014/12/20</a:t>
+              <a:t>2015/02/10</a:t>
             </a:fld>
             <a:endParaRPr kumimoji="1" lang="ja-JP" altLang="en-US"/>
           </a:p>
@@ -1268,7 +1268,7 @@
           <a:p>
             <a:fld id="{7B9B12EC-6AA0-374B-A2D3-850081A07A26}" type="datetimeFigureOut">
               <a:rPr kumimoji="1" lang="ja-JP" altLang="en-US" smtClean="0"/>
-              <a:t>2014/12/20</a:t>
+              <a:t>2015/02/10</a:t>
             </a:fld>
             <a:endParaRPr kumimoji="1" lang="ja-JP" altLang="en-US"/>
           </a:p>
@@ -1470,7 +1470,7 @@
           <a:p>
             <a:fld id="{7B9B12EC-6AA0-374B-A2D3-850081A07A26}" type="datetimeFigureOut">
               <a:rPr kumimoji="1" lang="ja-JP" altLang="en-US" smtClean="0"/>
-              <a:t>2014/12/20</a:t>
+              <a:t>2015/02/10</a:t>
             </a:fld>
             <a:endParaRPr kumimoji="1" lang="ja-JP" altLang="en-US"/>
           </a:p>
@@ -1716,7 +1716,7 @@
           <a:p>
             <a:fld id="{7B9B12EC-6AA0-374B-A2D3-850081A07A26}" type="datetimeFigureOut">
               <a:rPr kumimoji="1" lang="ja-JP" altLang="en-US" smtClean="0"/>
-              <a:t>2014/12/20</a:t>
+              <a:t>2015/02/10</a:t>
             </a:fld>
             <a:endParaRPr kumimoji="1" lang="ja-JP" altLang="en-US"/>
           </a:p>
@@ -2068,7 +2068,7 @@
           <a:p>
             <a:fld id="{7B9B12EC-6AA0-374B-A2D3-850081A07A26}" type="datetimeFigureOut">
               <a:rPr kumimoji="1" lang="ja-JP" altLang="en-US" smtClean="0"/>
-              <a:t>2014/12/20</a:t>
+              <a:t>2015/02/10</a:t>
             </a:fld>
             <a:endParaRPr kumimoji="1" lang="ja-JP" altLang="en-US"/>
           </a:p>
@@ -2554,7 +2554,7 @@
           <a:p>
             <a:fld id="{7B9B12EC-6AA0-374B-A2D3-850081A07A26}" type="datetimeFigureOut">
               <a:rPr kumimoji="1" lang="ja-JP" altLang="en-US" smtClean="0"/>
-              <a:t>2014/12/20</a:t>
+              <a:t>2015/02/10</a:t>
             </a:fld>
             <a:endParaRPr kumimoji="1" lang="ja-JP" altLang="en-US"/>
           </a:p>
@@ -2672,7 +2672,7 @@
           <a:p>
             <a:fld id="{7B9B12EC-6AA0-374B-A2D3-850081A07A26}" type="datetimeFigureOut">
               <a:rPr kumimoji="1" lang="ja-JP" altLang="en-US" smtClean="0"/>
-              <a:t>2014/12/20</a:t>
+              <a:t>2015/02/10</a:t>
             </a:fld>
             <a:endParaRPr kumimoji="1" lang="ja-JP" altLang="en-US"/>
           </a:p>
@@ -2767,7 +2767,7 @@
           <a:p>
             <a:fld id="{7B9B12EC-6AA0-374B-A2D3-850081A07A26}" type="datetimeFigureOut">
               <a:rPr kumimoji="1" lang="ja-JP" altLang="en-US" smtClean="0"/>
-              <a:t>2014/12/20</a:t>
+              <a:t>2015/02/10</a:t>
             </a:fld>
             <a:endParaRPr kumimoji="1" lang="ja-JP" altLang="en-US"/>
           </a:p>
@@ -3076,7 +3076,7 @@
           <a:p>
             <a:fld id="{7B9B12EC-6AA0-374B-A2D3-850081A07A26}" type="datetimeFigureOut">
               <a:rPr kumimoji="1" lang="ja-JP" altLang="en-US" smtClean="0"/>
-              <a:t>2014/12/20</a:t>
+              <a:t>2015/02/10</a:t>
             </a:fld>
             <a:endParaRPr kumimoji="1" lang="ja-JP" altLang="en-US"/>
           </a:p>
@@ -3329,7 +3329,7 @@
           <a:p>
             <a:fld id="{7B9B12EC-6AA0-374B-A2D3-850081A07A26}" type="datetimeFigureOut">
               <a:rPr kumimoji="1" lang="ja-JP" altLang="en-US" smtClean="0"/>
-              <a:t>2014/12/20</a:t>
+              <a:t>2015/02/10</a:t>
             </a:fld>
             <a:endParaRPr kumimoji="1" lang="ja-JP" altLang="en-US"/>
           </a:p>
@@ -3574,7 +3574,7 @@
           <a:p>
             <a:fld id="{7B9B12EC-6AA0-374B-A2D3-850081A07A26}" type="datetimeFigureOut">
               <a:rPr kumimoji="1" lang="ja-JP" altLang="en-US" smtClean="0"/>
-              <a:t>2014/12/20</a:t>
+              <a:t>2015/02/10</a:t>
             </a:fld>
             <a:endParaRPr kumimoji="1" lang="ja-JP" altLang="en-US"/>
           </a:p>
@@ -4217,17 +4217,22 @@
           <a:p>
             <a:pPr algn="ctr"/>
             <a:r>
-              <a:rPr lang="en-US" altLang="ja-JP" sz="2000" dirty="0" smtClean="0"/>
-              <a:t>Spring Data JPA</a:t>
-            </a:r>
-          </a:p>
-          <a:p>
-            <a:pPr algn="ctr"/>
-            <a:r>
               <a:rPr kumimoji="1" lang="en-US" altLang="ja-JP" sz="2000" dirty="0" err="1" smtClean="0"/>
               <a:t>MyBatis</a:t>
             </a:r>
-            <a:endParaRPr kumimoji="1" lang="ja-JP" altLang="en-US" sz="2000" dirty="0"/>
+            <a:endParaRPr kumimoji="1" lang="en-US" altLang="ja-JP" sz="2000" dirty="0" smtClean="0"/>
+          </a:p>
+          <a:p>
+            <a:pPr algn="ctr"/>
+            <a:r>
+              <a:rPr lang="en-US" altLang="ja-JP" sz="2000" dirty="0"/>
+              <a:t>Spring Data </a:t>
+            </a:r>
+            <a:r>
+              <a:rPr lang="en-US" altLang="ja-JP" sz="2000" dirty="0" smtClean="0"/>
+              <a:t>JPA</a:t>
+            </a:r>
+            <a:endParaRPr lang="en-US" altLang="ja-JP" sz="2000" dirty="0"/>
           </a:p>
         </p:txBody>
       </p:sp>
@@ -5110,8 +5115,8 @@
         </p:nvSpPr>
         <p:spPr>
           <a:xfrm>
-            <a:off x="6653531" y="2916501"/>
-            <a:ext cx="1688784" cy="439762"/>
+            <a:off x="6828156" y="2306094"/>
+            <a:ext cx="1688784" cy="790822"/>
           </a:xfrm>
           <a:prstGeom prst="roundRect">
             <a:avLst/>
@@ -5140,7 +5145,22 @@
               <a:rPr lang="en-US" altLang="ja-JP" dirty="0" smtClean="0"/>
               <a:t>MyBatis3</a:t>
             </a:r>
-            <a:endParaRPr kumimoji="1" lang="ja-JP" altLang="en-US" dirty="0"/>
+          </a:p>
+          <a:p>
+            <a:pPr algn="ctr"/>
+            <a:r>
+              <a:rPr lang="en-US" altLang="ja-JP" sz="1100" dirty="0" smtClean="0"/>
+              <a:t>(</a:t>
+            </a:r>
+            <a:r>
+              <a:rPr lang="en-US" altLang="ja-JP" sz="1100" dirty="0"/>
+              <a:t>MyBatis2</a:t>
+            </a:r>
+            <a:r>
+              <a:rPr lang="en-US" altLang="ja-JP" sz="1100" dirty="0" smtClean="0"/>
+              <a:t>)</a:t>
+            </a:r>
+            <a:endParaRPr lang="ja-JP" altLang="en-US" sz="1100" dirty="0"/>
           </a:p>
         </p:txBody>
       </p:sp>
@@ -5353,8 +5373,8 @@
         </p:nvSpPr>
         <p:spPr>
           <a:xfrm>
-            <a:off x="6653530" y="2318626"/>
-            <a:ext cx="1688785" cy="439762"/>
+            <a:off x="6856730" y="3198516"/>
+            <a:ext cx="1688785" cy="737180"/>
           </a:xfrm>
           <a:prstGeom prst="roundRect">
             <a:avLst/>
@@ -5475,48 +5495,6 @@
       </p:cxnSp>
       <p:sp>
         <p:nvSpPr>
-          <p:cNvPr id="71" name="角丸四角形 70"/>
-          <p:cNvSpPr/>
-          <p:nvPr/>
-        </p:nvSpPr>
-        <p:spPr>
-          <a:xfrm>
-            <a:off x="6663056" y="3499138"/>
-            <a:ext cx="1679259" cy="439762"/>
-          </a:xfrm>
-          <a:prstGeom prst="roundRect">
-            <a:avLst/>
-          </a:prstGeom>
-        </p:spPr>
-        <p:style>
-          <a:lnRef idx="1">
-            <a:schemeClr val="accent4"/>
-          </a:lnRef>
-          <a:fillRef idx="3">
-            <a:schemeClr val="accent4"/>
-          </a:fillRef>
-          <a:effectRef idx="2">
-            <a:schemeClr val="accent4"/>
-          </a:effectRef>
-          <a:fontRef idx="minor">
-            <a:schemeClr val="lt1"/>
-          </a:fontRef>
-        </p:style>
-        <p:txBody>
-          <a:bodyPr rtlCol="0" anchor="ctr"/>
-          <a:lstStyle/>
-          <a:p>
-            <a:pPr algn="ctr"/>
-            <a:r>
-              <a:rPr lang="en-US" altLang="ja-JP" dirty="0" smtClean="0"/>
-              <a:t>MyBatis2</a:t>
-            </a:r>
-            <a:endParaRPr kumimoji="1" lang="ja-JP" altLang="en-US" dirty="0"/>
-          </a:p>
-        </p:txBody>
-      </p:sp>
-      <p:sp>
-        <p:nvSpPr>
           <p:cNvPr id="77" name="角丸四角形 76"/>
           <p:cNvSpPr/>
           <p:nvPr/>
@@ -5687,7 +5665,7 @@
         </p:nvSpPr>
         <p:spPr>
           <a:xfrm>
-            <a:off x="8280248" y="2521209"/>
+            <a:off x="8127848" y="3651509"/>
             <a:ext cx="539593" cy="334987"/>
           </a:xfrm>
           <a:prstGeom prst="roundRect">
@@ -6301,14 +6279,6 @@
               </a:rPr>
               <a:t>…</a:t>
             </a:r>
-            <a:endParaRPr kumimoji="1" lang="en-US" altLang="ja-JP" sz="1600" dirty="0" smtClean="0">
-              <a:solidFill>
-                <a:schemeClr val="tx1">
-                  <a:lumMod val="75000"/>
-                  <a:lumOff val="25000"/>
-                </a:schemeClr>
-              </a:solidFill>
-            </a:endParaRPr>
           </a:p>
         </p:txBody>
       </p:sp>
@@ -6463,14 +6433,6 @@
               </a:rPr>
               <a:t>…</a:t>
             </a:r>
-            <a:endParaRPr kumimoji="1" lang="en-US" altLang="ja-JP" sz="1600" dirty="0" smtClean="0">
-              <a:solidFill>
-                <a:schemeClr val="tx1">
-                  <a:lumMod val="75000"/>
-                  <a:lumOff val="25000"/>
-                </a:schemeClr>
-              </a:solidFill>
-            </a:endParaRPr>
           </a:p>
         </p:txBody>
       </p:sp>
@@ -6555,14 +6517,6 @@
               </a:rPr>
               <a:t>…</a:t>
             </a:r>
-            <a:endParaRPr kumimoji="1" lang="en-US" altLang="ja-JP" sz="1600" dirty="0" smtClean="0">
-              <a:solidFill>
-                <a:schemeClr val="tx1">
-                  <a:lumMod val="75000"/>
-                  <a:lumOff val="25000"/>
-                </a:schemeClr>
-              </a:solidFill>
-            </a:endParaRPr>
           </a:p>
         </p:txBody>
       </p:sp>

</xml_diff>

<commit_message>
Remove explanation of the MyBatis2. #837
</commit_message>
<xml_diff>
--- a/source/Overview/images_FrameworkStack/materialFrameworkStack.pptx
+++ b/source/Overview/images_FrameworkStack/materialFrameworkStack.pptx
@@ -205,7 +205,7 @@
           <a:p>
             <a:fld id="{3BB47352-BF5A-4CD2-B029-996118CD8E01}" type="datetimeFigureOut">
               <a:rPr kumimoji="1" lang="ja-JP" altLang="en-US" smtClean="0"/>
-              <a:t>2015/02/10</a:t>
+              <a:t>2015/2/12</a:t>
             </a:fld>
             <a:endParaRPr kumimoji="1" lang="ja-JP" altLang="en-US"/>
           </a:p>
@@ -854,7 +854,7 @@
           <a:p>
             <a:fld id="{7B9B12EC-6AA0-374B-A2D3-850081A07A26}" type="datetimeFigureOut">
               <a:rPr kumimoji="1" lang="ja-JP" altLang="en-US" smtClean="0"/>
-              <a:t>2015/02/10</a:t>
+              <a:t>2015/2/12</a:t>
             </a:fld>
             <a:endParaRPr kumimoji="1" lang="ja-JP" altLang="en-US"/>
           </a:p>
@@ -1056,7 +1056,7 @@
           <a:p>
             <a:fld id="{7B9B12EC-6AA0-374B-A2D3-850081A07A26}" type="datetimeFigureOut">
               <a:rPr kumimoji="1" lang="ja-JP" altLang="en-US" smtClean="0"/>
-              <a:t>2015/02/10</a:t>
+              <a:t>2015/2/12</a:t>
             </a:fld>
             <a:endParaRPr kumimoji="1" lang="ja-JP" altLang="en-US"/>
           </a:p>
@@ -1268,7 +1268,7 @@
           <a:p>
             <a:fld id="{7B9B12EC-6AA0-374B-A2D3-850081A07A26}" type="datetimeFigureOut">
               <a:rPr kumimoji="1" lang="ja-JP" altLang="en-US" smtClean="0"/>
-              <a:t>2015/02/10</a:t>
+              <a:t>2015/2/12</a:t>
             </a:fld>
             <a:endParaRPr kumimoji="1" lang="ja-JP" altLang="en-US"/>
           </a:p>
@@ -1470,7 +1470,7 @@
           <a:p>
             <a:fld id="{7B9B12EC-6AA0-374B-A2D3-850081A07A26}" type="datetimeFigureOut">
               <a:rPr kumimoji="1" lang="ja-JP" altLang="en-US" smtClean="0"/>
-              <a:t>2015/02/10</a:t>
+              <a:t>2015/2/12</a:t>
             </a:fld>
             <a:endParaRPr kumimoji="1" lang="ja-JP" altLang="en-US"/>
           </a:p>
@@ -1716,7 +1716,7 @@
           <a:p>
             <a:fld id="{7B9B12EC-6AA0-374B-A2D3-850081A07A26}" type="datetimeFigureOut">
               <a:rPr kumimoji="1" lang="ja-JP" altLang="en-US" smtClean="0"/>
-              <a:t>2015/02/10</a:t>
+              <a:t>2015/2/12</a:t>
             </a:fld>
             <a:endParaRPr kumimoji="1" lang="ja-JP" altLang="en-US"/>
           </a:p>
@@ -2068,7 +2068,7 @@
           <a:p>
             <a:fld id="{7B9B12EC-6AA0-374B-A2D3-850081A07A26}" type="datetimeFigureOut">
               <a:rPr kumimoji="1" lang="ja-JP" altLang="en-US" smtClean="0"/>
-              <a:t>2015/02/10</a:t>
+              <a:t>2015/2/12</a:t>
             </a:fld>
             <a:endParaRPr kumimoji="1" lang="ja-JP" altLang="en-US"/>
           </a:p>
@@ -2554,7 +2554,7 @@
           <a:p>
             <a:fld id="{7B9B12EC-6AA0-374B-A2D3-850081A07A26}" type="datetimeFigureOut">
               <a:rPr kumimoji="1" lang="ja-JP" altLang="en-US" smtClean="0"/>
-              <a:t>2015/02/10</a:t>
+              <a:t>2015/2/12</a:t>
             </a:fld>
             <a:endParaRPr kumimoji="1" lang="ja-JP" altLang="en-US"/>
           </a:p>
@@ -2672,7 +2672,7 @@
           <a:p>
             <a:fld id="{7B9B12EC-6AA0-374B-A2D3-850081A07A26}" type="datetimeFigureOut">
               <a:rPr kumimoji="1" lang="ja-JP" altLang="en-US" smtClean="0"/>
-              <a:t>2015/02/10</a:t>
+              <a:t>2015/2/12</a:t>
             </a:fld>
             <a:endParaRPr kumimoji="1" lang="ja-JP" altLang="en-US"/>
           </a:p>
@@ -2767,7 +2767,7 @@
           <a:p>
             <a:fld id="{7B9B12EC-6AA0-374B-A2D3-850081A07A26}" type="datetimeFigureOut">
               <a:rPr kumimoji="1" lang="ja-JP" altLang="en-US" smtClean="0"/>
-              <a:t>2015/02/10</a:t>
+              <a:t>2015/2/12</a:t>
             </a:fld>
             <a:endParaRPr kumimoji="1" lang="ja-JP" altLang="en-US"/>
           </a:p>
@@ -3076,7 +3076,7 @@
           <a:p>
             <a:fld id="{7B9B12EC-6AA0-374B-A2D3-850081A07A26}" type="datetimeFigureOut">
               <a:rPr kumimoji="1" lang="ja-JP" altLang="en-US" smtClean="0"/>
-              <a:t>2015/02/10</a:t>
+              <a:t>2015/2/12</a:t>
             </a:fld>
             <a:endParaRPr kumimoji="1" lang="ja-JP" altLang="en-US"/>
           </a:p>
@@ -3329,7 +3329,7 @@
           <a:p>
             <a:fld id="{7B9B12EC-6AA0-374B-A2D3-850081A07A26}" type="datetimeFigureOut">
               <a:rPr kumimoji="1" lang="ja-JP" altLang="en-US" smtClean="0"/>
-              <a:t>2015/02/10</a:t>
+              <a:t>2015/2/12</a:t>
             </a:fld>
             <a:endParaRPr kumimoji="1" lang="ja-JP" altLang="en-US"/>
           </a:p>
@@ -3574,7 +3574,7 @@
           <a:p>
             <a:fld id="{7B9B12EC-6AA0-374B-A2D3-850081A07A26}" type="datetimeFigureOut">
               <a:rPr kumimoji="1" lang="ja-JP" altLang="en-US" smtClean="0"/>
-              <a:t>2015/02/10</a:t>
+              <a:t>2015/2/12</a:t>
             </a:fld>
             <a:endParaRPr kumimoji="1" lang="ja-JP" altLang="en-US"/>
           </a:p>
@@ -4834,7 +4834,7 @@
   <p:timing>
     <p:tnLst>
       <p:par>
-        <p:cTn xmlns:p14="http://schemas.microsoft.com/office/powerpoint/2010/main" id="1" dur="indefinite" restart="never" nodeType="tmRoot"/>
+        <p:cTn id="1" dur="indefinite" restart="never" nodeType="tmRoot"/>
       </p:par>
     </p:tnLst>
   </p:timing>
@@ -5145,22 +5145,7 @@
               <a:rPr lang="en-US" altLang="ja-JP" dirty="0" smtClean="0"/>
               <a:t>MyBatis3</a:t>
             </a:r>
-          </a:p>
-          <a:p>
-            <a:pPr algn="ctr"/>
-            <a:r>
-              <a:rPr lang="en-US" altLang="ja-JP" sz="1100" dirty="0" smtClean="0"/>
-              <a:t>(</a:t>
-            </a:r>
-            <a:r>
-              <a:rPr lang="en-US" altLang="ja-JP" sz="1100" dirty="0"/>
-              <a:t>MyBatis2</a:t>
-            </a:r>
-            <a:r>
-              <a:rPr lang="en-US" altLang="ja-JP" sz="1100" dirty="0" smtClean="0"/>
-              <a:t>)</a:t>
-            </a:r>
-            <a:endParaRPr lang="ja-JP" altLang="en-US" sz="1100" dirty="0"/>
+            <a:endParaRPr lang="en-US" altLang="ja-JP" dirty="0" smtClean="0"/>
           </a:p>
         </p:txBody>
       </p:sp>
@@ -6653,7 +6638,7 @@
   <p:timing>
     <p:tnLst>
       <p:par>
-        <p:cTn xmlns:p14="http://schemas.microsoft.com/office/powerpoint/2010/main" id="1" dur="indefinite" restart="never" nodeType="tmRoot"/>
+        <p:cTn id="1" dur="indefinite" restart="never" nodeType="tmRoot"/>
       </p:par>
     </p:tnLst>
   </p:timing>

</xml_diff>

<commit_message>
Correct OverviewFrameworkStack Images. #867
</commit_message>
<xml_diff>
--- a/source/Overview/images_FrameworkStack/materialFrameworkStack.pptx
+++ b/source/Overview/images_FrameworkStack/materialFrameworkStack.pptx
@@ -205,7 +205,7 @@
           <a:p>
             <a:fld id="{3BB47352-BF5A-4CD2-B029-996118CD8E01}" type="datetimeFigureOut">
               <a:rPr kumimoji="1" lang="ja-JP" altLang="en-US" smtClean="0"/>
-              <a:t>2015/2/12</a:t>
+              <a:t>2015/3/3</a:t>
             </a:fld>
             <a:endParaRPr kumimoji="1" lang="ja-JP" altLang="en-US"/>
           </a:p>
@@ -854,7 +854,7 @@
           <a:p>
             <a:fld id="{7B9B12EC-6AA0-374B-A2D3-850081A07A26}" type="datetimeFigureOut">
               <a:rPr kumimoji="1" lang="ja-JP" altLang="en-US" smtClean="0"/>
-              <a:t>2015/2/12</a:t>
+              <a:t>2015/3/3</a:t>
             </a:fld>
             <a:endParaRPr kumimoji="1" lang="ja-JP" altLang="en-US"/>
           </a:p>
@@ -1056,7 +1056,7 @@
           <a:p>
             <a:fld id="{7B9B12EC-6AA0-374B-A2D3-850081A07A26}" type="datetimeFigureOut">
               <a:rPr kumimoji="1" lang="ja-JP" altLang="en-US" smtClean="0"/>
-              <a:t>2015/2/12</a:t>
+              <a:t>2015/3/3</a:t>
             </a:fld>
             <a:endParaRPr kumimoji="1" lang="ja-JP" altLang="en-US"/>
           </a:p>
@@ -1268,7 +1268,7 @@
           <a:p>
             <a:fld id="{7B9B12EC-6AA0-374B-A2D3-850081A07A26}" type="datetimeFigureOut">
               <a:rPr kumimoji="1" lang="ja-JP" altLang="en-US" smtClean="0"/>
-              <a:t>2015/2/12</a:t>
+              <a:t>2015/3/3</a:t>
             </a:fld>
             <a:endParaRPr kumimoji="1" lang="ja-JP" altLang="en-US"/>
           </a:p>
@@ -1470,7 +1470,7 @@
           <a:p>
             <a:fld id="{7B9B12EC-6AA0-374B-A2D3-850081A07A26}" type="datetimeFigureOut">
               <a:rPr kumimoji="1" lang="ja-JP" altLang="en-US" smtClean="0"/>
-              <a:t>2015/2/12</a:t>
+              <a:t>2015/3/3</a:t>
             </a:fld>
             <a:endParaRPr kumimoji="1" lang="ja-JP" altLang="en-US"/>
           </a:p>
@@ -1716,7 +1716,7 @@
           <a:p>
             <a:fld id="{7B9B12EC-6AA0-374B-A2D3-850081A07A26}" type="datetimeFigureOut">
               <a:rPr kumimoji="1" lang="ja-JP" altLang="en-US" smtClean="0"/>
-              <a:t>2015/2/12</a:t>
+              <a:t>2015/3/3</a:t>
             </a:fld>
             <a:endParaRPr kumimoji="1" lang="ja-JP" altLang="en-US"/>
           </a:p>
@@ -2068,7 +2068,7 @@
           <a:p>
             <a:fld id="{7B9B12EC-6AA0-374B-A2D3-850081A07A26}" type="datetimeFigureOut">
               <a:rPr kumimoji="1" lang="ja-JP" altLang="en-US" smtClean="0"/>
-              <a:t>2015/2/12</a:t>
+              <a:t>2015/3/3</a:t>
             </a:fld>
             <a:endParaRPr kumimoji="1" lang="ja-JP" altLang="en-US"/>
           </a:p>
@@ -2554,7 +2554,7 @@
           <a:p>
             <a:fld id="{7B9B12EC-6AA0-374B-A2D3-850081A07A26}" type="datetimeFigureOut">
               <a:rPr kumimoji="1" lang="ja-JP" altLang="en-US" smtClean="0"/>
-              <a:t>2015/2/12</a:t>
+              <a:t>2015/3/3</a:t>
             </a:fld>
             <a:endParaRPr kumimoji="1" lang="ja-JP" altLang="en-US"/>
           </a:p>
@@ -2672,7 +2672,7 @@
           <a:p>
             <a:fld id="{7B9B12EC-6AA0-374B-A2D3-850081A07A26}" type="datetimeFigureOut">
               <a:rPr kumimoji="1" lang="ja-JP" altLang="en-US" smtClean="0"/>
-              <a:t>2015/2/12</a:t>
+              <a:t>2015/3/3</a:t>
             </a:fld>
             <a:endParaRPr kumimoji="1" lang="ja-JP" altLang="en-US"/>
           </a:p>
@@ -2767,7 +2767,7 @@
           <a:p>
             <a:fld id="{7B9B12EC-6AA0-374B-A2D3-850081A07A26}" type="datetimeFigureOut">
               <a:rPr kumimoji="1" lang="ja-JP" altLang="en-US" smtClean="0"/>
-              <a:t>2015/2/12</a:t>
+              <a:t>2015/3/3</a:t>
             </a:fld>
             <a:endParaRPr kumimoji="1" lang="ja-JP" altLang="en-US"/>
           </a:p>
@@ -3076,7 +3076,7 @@
           <a:p>
             <a:fld id="{7B9B12EC-6AA0-374B-A2D3-850081A07A26}" type="datetimeFigureOut">
               <a:rPr kumimoji="1" lang="ja-JP" altLang="en-US" smtClean="0"/>
-              <a:t>2015/2/12</a:t>
+              <a:t>2015/3/3</a:t>
             </a:fld>
             <a:endParaRPr kumimoji="1" lang="ja-JP" altLang="en-US"/>
           </a:p>
@@ -3329,7 +3329,7 @@
           <a:p>
             <a:fld id="{7B9B12EC-6AA0-374B-A2D3-850081A07A26}" type="datetimeFigureOut">
               <a:rPr kumimoji="1" lang="ja-JP" altLang="en-US" smtClean="0"/>
-              <a:t>2015/2/12</a:t>
+              <a:t>2015/3/3</a:t>
             </a:fld>
             <a:endParaRPr kumimoji="1" lang="ja-JP" altLang="en-US"/>
           </a:p>
@@ -3574,7 +3574,7 @@
           <a:p>
             <a:fld id="{7B9B12EC-6AA0-374B-A2D3-850081A07A26}" type="datetimeFigureOut">
               <a:rPr kumimoji="1" lang="ja-JP" altLang="en-US" smtClean="0"/>
-              <a:t>2015/2/12</a:t>
+              <a:t>2015/3/3</a:t>
             </a:fld>
             <a:endParaRPr kumimoji="1" lang="ja-JP" altLang="en-US"/>
           </a:p>
@@ -4803,7 +4803,7 @@
             </a:r>
             <a:r>
               <a:rPr lang="en-US" altLang="ja-JP" dirty="0" smtClean="0"/>
-              <a:t>Brower</a:t>
+              <a:t>Browser</a:t>
             </a:r>
             <a:endParaRPr lang="en-US" altLang="ja-JP" dirty="0"/>
           </a:p>
@@ -5145,7 +5145,6 @@
               <a:rPr lang="en-US" altLang="ja-JP" dirty="0" smtClean="0"/>
               <a:t>MyBatis3</a:t>
             </a:r>
-            <a:endParaRPr lang="en-US" altLang="ja-JP" dirty="0" smtClean="0"/>
           </a:p>
         </p:txBody>
       </p:sp>
@@ -5729,7 +5728,7 @@
             </a:r>
             <a:r>
               <a:rPr lang="en-US" altLang="ja-JP" dirty="0" smtClean="0"/>
-              <a:t>Brower</a:t>
+              <a:t>Browser</a:t>
             </a:r>
             <a:endParaRPr lang="en-US" altLang="ja-JP" dirty="0"/>
           </a:p>

</xml_diff>

<commit_message>
#1148: Improve descriptions of Framewrok Stack
* Add artifact descriptions for recommended modules and parent module
* Add illustration of project dependency between each artifacts
* Improve some description of common libraries
* Adjust width of table for PDF output
</commit_message>
<xml_diff>
--- a/source/Overview/images_FrameworkStack/materialFrameworkStack.pptx
+++ b/source/Overview/images_FrameworkStack/materialFrameworkStack.pptx
@@ -5,11 +5,12 @@
     <p:sldMasterId id="2147483648" r:id="rId1"/>
   </p:sldMasterIdLst>
   <p:notesMasterIdLst>
-    <p:notesMasterId r:id="rId4"/>
+    <p:notesMasterId r:id="rId5"/>
   </p:notesMasterIdLst>
   <p:sldIdLst>
     <p:sldId id="272" r:id="rId2"/>
     <p:sldId id="337" r:id="rId3"/>
+    <p:sldId id="338" r:id="rId4"/>
   </p:sldIdLst>
   <p:sldSz cx="9144000" cy="6858000" type="screen4x3"/>
   <p:notesSz cx="6858000" cy="9144000"/>
@@ -115,6 +116,7 @@
           <p14:sldIdLst>
             <p14:sldId id="272"/>
             <p14:sldId id="337"/>
+            <p14:sldId id="338"/>
           </p14:sldIdLst>
         </p14:section>
       </p14:sectionLst>
@@ -205,7 +207,7 @@
           <a:p>
             <a:fld id="{3BB47352-BF5A-4CD2-B029-996118CD8E01}" type="datetimeFigureOut">
               <a:rPr kumimoji="1" lang="ja-JP" altLang="en-US" smtClean="0"/>
-              <a:t>2015/3/3</a:t>
+              <a:t>15/06/13</a:t>
             </a:fld>
             <a:endParaRPr kumimoji="1" lang="ja-JP" altLang="en-US"/>
           </a:p>
@@ -673,6 +675,90 @@
 </p:notes>
 </file>
 
+<file path=ppt/notesSlides/notesSlide3.xml><?xml version="1.0" encoding="utf-8"?>
+<p:notes xmlns:a="http://schemas.openxmlformats.org/drawingml/2006/main" xmlns:r="http://schemas.openxmlformats.org/officeDocument/2006/relationships" xmlns:p="http://schemas.openxmlformats.org/presentationml/2006/main">
+  <p:cSld>
+    <p:spTree>
+      <p:nvGrpSpPr>
+        <p:cNvPr id="1" name=""/>
+        <p:cNvGrpSpPr/>
+        <p:nvPr/>
+      </p:nvGrpSpPr>
+      <p:grpSpPr>
+        <a:xfrm>
+          <a:off x="0" y="0"/>
+          <a:ext cx="0" cy="0"/>
+          <a:chOff x="0" y="0"/>
+          <a:chExt cx="0" cy="0"/>
+        </a:xfrm>
+      </p:grpSpPr>
+      <p:sp>
+        <p:nvSpPr>
+          <p:cNvPr id="2" name="スライド イメージ プレースホルダー 1"/>
+          <p:cNvSpPr>
+            <a:spLocks noGrp="1" noRot="1" noChangeAspect="1"/>
+          </p:cNvSpPr>
+          <p:nvPr>
+            <p:ph type="sldImg"/>
+          </p:nvPr>
+        </p:nvSpPr>
+        <p:spPr/>
+      </p:sp>
+      <p:sp>
+        <p:nvSpPr>
+          <p:cNvPr id="3" name="ノート プレースホルダー 2"/>
+          <p:cNvSpPr>
+            <a:spLocks noGrp="1"/>
+          </p:cNvSpPr>
+          <p:nvPr>
+            <p:ph type="body" idx="1"/>
+          </p:nvPr>
+        </p:nvSpPr>
+        <p:spPr/>
+        <p:txBody>
+          <a:bodyPr/>
+          <a:lstStyle/>
+          <a:p>
+            <a:endParaRPr kumimoji="1" lang="ja-JP" altLang="en-US" dirty="0"/>
+          </a:p>
+        </p:txBody>
+      </p:sp>
+      <p:sp>
+        <p:nvSpPr>
+          <p:cNvPr id="4" name="スライド番号プレースホルダー 3"/>
+          <p:cNvSpPr>
+            <a:spLocks noGrp="1"/>
+          </p:cNvSpPr>
+          <p:nvPr>
+            <p:ph type="sldNum" sz="quarter" idx="10"/>
+          </p:nvPr>
+        </p:nvSpPr>
+        <p:spPr/>
+        <p:txBody>
+          <a:bodyPr/>
+          <a:lstStyle/>
+          <a:p>
+            <a:fld id="{003CFFA3-9D07-4088-826B-DF328166082C}" type="slidenum">
+              <a:rPr kumimoji="1" lang="ja-JP" altLang="en-US" smtClean="0"/>
+              <a:t>3</a:t>
+            </a:fld>
+            <a:endParaRPr kumimoji="1" lang="ja-JP" altLang="en-US"/>
+          </a:p>
+        </p:txBody>
+      </p:sp>
+    </p:spTree>
+    <p:extLst>
+      <p:ext uri="{BB962C8B-B14F-4D97-AF65-F5344CB8AC3E}">
+        <p14:creationId xmlns:p14="http://schemas.microsoft.com/office/powerpoint/2010/main" val="1282525066"/>
+      </p:ext>
+    </p:extLst>
+  </p:cSld>
+  <p:clrMapOvr>
+    <a:masterClrMapping/>
+  </p:clrMapOvr>
+</p:notes>
+</file>
+
 <file path=ppt/slideLayouts/slideLayout1.xml><?xml version="1.0" encoding="utf-8"?>
 <p:sldLayout xmlns:a="http://schemas.openxmlformats.org/drawingml/2006/main" xmlns:r="http://schemas.openxmlformats.org/officeDocument/2006/relationships" xmlns:p="http://schemas.openxmlformats.org/presentationml/2006/main" type="title" preserve="1">
   <p:cSld name="タイトル スライド">
@@ -854,7 +940,7 @@
           <a:p>
             <a:fld id="{7B9B12EC-6AA0-374B-A2D3-850081A07A26}" type="datetimeFigureOut">
               <a:rPr kumimoji="1" lang="ja-JP" altLang="en-US" smtClean="0"/>
-              <a:t>2015/3/3</a:t>
+              <a:t>15/06/13</a:t>
             </a:fld>
             <a:endParaRPr kumimoji="1" lang="ja-JP" altLang="en-US"/>
           </a:p>
@@ -1056,7 +1142,7 @@
           <a:p>
             <a:fld id="{7B9B12EC-6AA0-374B-A2D3-850081A07A26}" type="datetimeFigureOut">
               <a:rPr kumimoji="1" lang="ja-JP" altLang="en-US" smtClean="0"/>
-              <a:t>2015/3/3</a:t>
+              <a:t>15/06/13</a:t>
             </a:fld>
             <a:endParaRPr kumimoji="1" lang="ja-JP" altLang="en-US"/>
           </a:p>
@@ -1268,7 +1354,7 @@
           <a:p>
             <a:fld id="{7B9B12EC-6AA0-374B-A2D3-850081A07A26}" type="datetimeFigureOut">
               <a:rPr kumimoji="1" lang="ja-JP" altLang="en-US" smtClean="0"/>
-              <a:t>2015/3/3</a:t>
+              <a:t>15/06/13</a:t>
             </a:fld>
             <a:endParaRPr kumimoji="1" lang="ja-JP" altLang="en-US"/>
           </a:p>
@@ -1470,7 +1556,7 @@
           <a:p>
             <a:fld id="{7B9B12EC-6AA0-374B-A2D3-850081A07A26}" type="datetimeFigureOut">
               <a:rPr kumimoji="1" lang="ja-JP" altLang="en-US" smtClean="0"/>
-              <a:t>2015/3/3</a:t>
+              <a:t>15/06/13</a:t>
             </a:fld>
             <a:endParaRPr kumimoji="1" lang="ja-JP" altLang="en-US"/>
           </a:p>
@@ -1716,7 +1802,7 @@
           <a:p>
             <a:fld id="{7B9B12EC-6AA0-374B-A2D3-850081A07A26}" type="datetimeFigureOut">
               <a:rPr kumimoji="1" lang="ja-JP" altLang="en-US" smtClean="0"/>
-              <a:t>2015/3/3</a:t>
+              <a:t>15/06/13</a:t>
             </a:fld>
             <a:endParaRPr kumimoji="1" lang="ja-JP" altLang="en-US"/>
           </a:p>
@@ -2068,7 +2154,7 @@
           <a:p>
             <a:fld id="{7B9B12EC-6AA0-374B-A2D3-850081A07A26}" type="datetimeFigureOut">
               <a:rPr kumimoji="1" lang="ja-JP" altLang="en-US" smtClean="0"/>
-              <a:t>2015/3/3</a:t>
+              <a:t>15/06/13</a:t>
             </a:fld>
             <a:endParaRPr kumimoji="1" lang="ja-JP" altLang="en-US"/>
           </a:p>
@@ -2554,7 +2640,7 @@
           <a:p>
             <a:fld id="{7B9B12EC-6AA0-374B-A2D3-850081A07A26}" type="datetimeFigureOut">
               <a:rPr kumimoji="1" lang="ja-JP" altLang="en-US" smtClean="0"/>
-              <a:t>2015/3/3</a:t>
+              <a:t>15/06/13</a:t>
             </a:fld>
             <a:endParaRPr kumimoji="1" lang="ja-JP" altLang="en-US"/>
           </a:p>
@@ -2672,7 +2758,7 @@
           <a:p>
             <a:fld id="{7B9B12EC-6AA0-374B-A2D3-850081A07A26}" type="datetimeFigureOut">
               <a:rPr kumimoji="1" lang="ja-JP" altLang="en-US" smtClean="0"/>
-              <a:t>2015/3/3</a:t>
+              <a:t>15/06/13</a:t>
             </a:fld>
             <a:endParaRPr kumimoji="1" lang="ja-JP" altLang="en-US"/>
           </a:p>
@@ -2767,7 +2853,7 @@
           <a:p>
             <a:fld id="{7B9B12EC-6AA0-374B-A2D3-850081A07A26}" type="datetimeFigureOut">
               <a:rPr kumimoji="1" lang="ja-JP" altLang="en-US" smtClean="0"/>
-              <a:t>2015/3/3</a:t>
+              <a:t>15/06/13</a:t>
             </a:fld>
             <a:endParaRPr kumimoji="1" lang="ja-JP" altLang="en-US"/>
           </a:p>
@@ -3076,7 +3162,7 @@
           <a:p>
             <a:fld id="{7B9B12EC-6AA0-374B-A2D3-850081A07A26}" type="datetimeFigureOut">
               <a:rPr kumimoji="1" lang="ja-JP" altLang="en-US" smtClean="0"/>
-              <a:t>2015/3/3</a:t>
+              <a:t>15/06/13</a:t>
             </a:fld>
             <a:endParaRPr kumimoji="1" lang="ja-JP" altLang="en-US"/>
           </a:p>
@@ -3329,7 +3415,7 @@
           <a:p>
             <a:fld id="{7B9B12EC-6AA0-374B-A2D3-850081A07A26}" type="datetimeFigureOut">
               <a:rPr kumimoji="1" lang="ja-JP" altLang="en-US" smtClean="0"/>
-              <a:t>2015/3/3</a:t>
+              <a:t>15/06/13</a:t>
             </a:fld>
             <a:endParaRPr kumimoji="1" lang="ja-JP" altLang="en-US"/>
           </a:p>
@@ -3574,7 +3660,7 @@
           <a:p>
             <a:fld id="{7B9B12EC-6AA0-374B-A2D3-850081A07A26}" type="datetimeFigureOut">
               <a:rPr kumimoji="1" lang="ja-JP" altLang="en-US" smtClean="0"/>
-              <a:t>2015/3/3</a:t>
+              <a:t>15/06/13</a:t>
             </a:fld>
             <a:endParaRPr kumimoji="1" lang="ja-JP" altLang="en-US"/>
           </a:p>
@@ -4834,7 +4920,7 @@
   <p:timing>
     <p:tnLst>
       <p:par>
-        <p:cTn id="1" dur="indefinite" restart="never" nodeType="tmRoot"/>
+        <p:cTn xmlns:p14="http://schemas.microsoft.com/office/powerpoint/2010/main" id="1" dur="indefinite" restart="never" nodeType="tmRoot"/>
       </p:par>
     </p:tnLst>
   </p:timing>
@@ -6637,7 +6723,1853 @@
   <p:timing>
     <p:tnLst>
       <p:par>
-        <p:cTn id="1" dur="indefinite" restart="never" nodeType="tmRoot"/>
+        <p:cTn xmlns:p14="http://schemas.microsoft.com/office/powerpoint/2010/main" id="1" dur="indefinite" restart="never" nodeType="tmRoot"/>
+      </p:par>
+    </p:tnLst>
+  </p:timing>
+</p:sld>
+</file>
+
+<file path=ppt/slides/slide3.xml><?xml version="1.0" encoding="utf-8"?>
+<p:sld xmlns:a="http://schemas.openxmlformats.org/drawingml/2006/main" xmlns:r="http://schemas.openxmlformats.org/officeDocument/2006/relationships" xmlns:p="http://schemas.openxmlformats.org/presentationml/2006/main">
+  <p:cSld>
+    <p:spTree>
+      <p:nvGrpSpPr>
+        <p:cNvPr id="1" name=""/>
+        <p:cNvGrpSpPr/>
+        <p:nvPr/>
+      </p:nvGrpSpPr>
+      <p:grpSpPr>
+        <a:xfrm>
+          <a:off x="0" y="0"/>
+          <a:ext cx="0" cy="0"/>
+          <a:chOff x="0" y="0"/>
+          <a:chExt cx="0" cy="0"/>
+        </a:xfrm>
+      </p:grpSpPr>
+      <p:sp>
+        <p:nvSpPr>
+          <p:cNvPr id="46" name="角丸四角形 45"/>
+          <p:cNvSpPr/>
+          <p:nvPr/>
+        </p:nvSpPr>
+        <p:spPr>
+          <a:xfrm>
+            <a:off x="3041856" y="3223242"/>
+            <a:ext cx="3387338" cy="368242"/>
+          </a:xfrm>
+          <a:prstGeom prst="roundRect">
+            <a:avLst/>
+          </a:prstGeom>
+          <a:gradFill>
+            <a:gsLst>
+              <a:gs pos="0">
+                <a:schemeClr val="bg1">
+                  <a:lumMod val="75000"/>
+                </a:schemeClr>
+              </a:gs>
+              <a:gs pos="100000">
+                <a:schemeClr val="bg1">
+                  <a:lumMod val="95000"/>
+                </a:schemeClr>
+              </a:gs>
+            </a:gsLst>
+          </a:gradFill>
+        </p:spPr>
+        <p:style>
+          <a:lnRef idx="1">
+            <a:schemeClr val="dk1"/>
+          </a:lnRef>
+          <a:fillRef idx="3">
+            <a:schemeClr val="dk1"/>
+          </a:fillRef>
+          <a:effectRef idx="2">
+            <a:schemeClr val="dk1"/>
+          </a:effectRef>
+          <a:fontRef idx="minor">
+            <a:schemeClr val="lt1"/>
+          </a:fontRef>
+        </p:style>
+        <p:txBody>
+          <a:bodyPr rtlCol="0" anchor="ctr"/>
+          <a:lstStyle/>
+          <a:p>
+            <a:pPr algn="ctr"/>
+            <a:r>
+              <a:rPr lang="en-US" altLang="ja-JP" sz="1600" dirty="0">
+                <a:solidFill>
+                  <a:schemeClr val="tx1">
+                    <a:lumMod val="75000"/>
+                    <a:lumOff val="25000"/>
+                  </a:schemeClr>
+                </a:solidFill>
+              </a:rPr>
+              <a:t>s</a:t>
+            </a:r>
+            <a:r>
+              <a:rPr lang="en-US" altLang="ja-JP" sz="1600" dirty="0" smtClean="0">
+                <a:solidFill>
+                  <a:schemeClr val="tx1">
+                    <a:lumMod val="75000"/>
+                    <a:lumOff val="25000"/>
+                  </a:schemeClr>
+                </a:solidFill>
+              </a:rPr>
+              <a:t>ecurity-core</a:t>
+            </a:r>
+            <a:endParaRPr kumimoji="1" lang="en-US" altLang="ja-JP" sz="1600" dirty="0" smtClean="0">
+              <a:solidFill>
+                <a:schemeClr val="tx1">
+                  <a:lumMod val="75000"/>
+                  <a:lumOff val="25000"/>
+                </a:schemeClr>
+              </a:solidFill>
+            </a:endParaRPr>
+          </a:p>
+        </p:txBody>
+      </p:sp>
+      <p:sp>
+        <p:nvSpPr>
+          <p:cNvPr id="47" name="角丸四角形 46"/>
+          <p:cNvSpPr/>
+          <p:nvPr/>
+        </p:nvSpPr>
+        <p:spPr>
+          <a:xfrm>
+            <a:off x="3045425" y="2552176"/>
+            <a:ext cx="3363924" cy="368242"/>
+          </a:xfrm>
+          <a:prstGeom prst="roundRect">
+            <a:avLst/>
+          </a:prstGeom>
+          <a:gradFill>
+            <a:gsLst>
+              <a:gs pos="0">
+                <a:schemeClr val="bg1">
+                  <a:lumMod val="75000"/>
+                </a:schemeClr>
+              </a:gs>
+              <a:gs pos="100000">
+                <a:schemeClr val="bg1">
+                  <a:lumMod val="95000"/>
+                </a:schemeClr>
+              </a:gs>
+            </a:gsLst>
+          </a:gradFill>
+        </p:spPr>
+        <p:style>
+          <a:lnRef idx="1">
+            <a:schemeClr val="dk1"/>
+          </a:lnRef>
+          <a:fillRef idx="3">
+            <a:schemeClr val="dk1"/>
+          </a:fillRef>
+          <a:effectRef idx="2">
+            <a:schemeClr val="dk1"/>
+          </a:effectRef>
+          <a:fontRef idx="minor">
+            <a:schemeClr val="lt1"/>
+          </a:fontRef>
+        </p:style>
+        <p:txBody>
+          <a:bodyPr rtlCol="0" anchor="ctr"/>
+          <a:lstStyle/>
+          <a:p>
+            <a:pPr algn="ctr"/>
+            <a:r>
+              <a:rPr lang="en-US" altLang="ja-JP" sz="1600" dirty="0">
+                <a:solidFill>
+                  <a:schemeClr val="tx1">
+                    <a:lumMod val="75000"/>
+                    <a:lumOff val="25000"/>
+                  </a:schemeClr>
+                </a:solidFill>
+              </a:rPr>
+              <a:t>s</a:t>
+            </a:r>
+            <a:r>
+              <a:rPr lang="en-US" altLang="ja-JP" sz="1600" dirty="0" smtClean="0">
+                <a:solidFill>
+                  <a:schemeClr val="tx1">
+                    <a:lumMod val="75000"/>
+                    <a:lumOff val="25000"/>
+                  </a:schemeClr>
+                </a:solidFill>
+              </a:rPr>
+              <a:t>ecurity-web</a:t>
+            </a:r>
+            <a:endParaRPr kumimoji="1" lang="en-US" altLang="ja-JP" sz="1600" dirty="0" smtClean="0">
+              <a:solidFill>
+                <a:schemeClr val="tx1">
+                  <a:lumMod val="75000"/>
+                  <a:lumOff val="25000"/>
+                </a:schemeClr>
+              </a:solidFill>
+            </a:endParaRPr>
+          </a:p>
+        </p:txBody>
+      </p:sp>
+      <p:sp>
+        <p:nvSpPr>
+          <p:cNvPr id="48" name="角丸四角形 47"/>
+          <p:cNvSpPr/>
+          <p:nvPr/>
+        </p:nvSpPr>
+        <p:spPr>
+          <a:xfrm>
+            <a:off x="3075191" y="5106646"/>
+            <a:ext cx="3363925" cy="368242"/>
+          </a:xfrm>
+          <a:prstGeom prst="roundRect">
+            <a:avLst/>
+          </a:prstGeom>
+          <a:gradFill>
+            <a:gsLst>
+              <a:gs pos="0">
+                <a:schemeClr val="bg1">
+                  <a:lumMod val="75000"/>
+                </a:schemeClr>
+              </a:gs>
+              <a:gs pos="100000">
+                <a:schemeClr val="bg1">
+                  <a:lumMod val="95000"/>
+                </a:schemeClr>
+              </a:gs>
+            </a:gsLst>
+          </a:gradFill>
+        </p:spPr>
+        <p:style>
+          <a:lnRef idx="1">
+            <a:schemeClr val="dk1"/>
+          </a:lnRef>
+          <a:fillRef idx="3">
+            <a:schemeClr val="dk1"/>
+          </a:fillRef>
+          <a:effectRef idx="2">
+            <a:schemeClr val="dk1"/>
+          </a:effectRef>
+          <a:fontRef idx="minor">
+            <a:schemeClr val="lt1"/>
+          </a:fontRef>
+        </p:style>
+        <p:txBody>
+          <a:bodyPr rtlCol="0" anchor="ctr"/>
+          <a:lstStyle/>
+          <a:p>
+            <a:pPr algn="ctr"/>
+            <a:r>
+              <a:rPr lang="en-US" altLang="ja-JP" sz="1600" dirty="0" smtClean="0">
+                <a:solidFill>
+                  <a:schemeClr val="tx1">
+                    <a:lumMod val="75000"/>
+                    <a:lumOff val="25000"/>
+                  </a:schemeClr>
+                </a:solidFill>
+              </a:rPr>
+              <a:t>recommended</a:t>
+            </a:r>
+            <a:r>
+              <a:rPr lang="en-US" altLang="ja-JP" sz="1600" dirty="0">
+                <a:solidFill>
+                  <a:schemeClr val="tx1">
+                    <a:lumMod val="75000"/>
+                    <a:lumOff val="25000"/>
+                  </a:schemeClr>
+                </a:solidFill>
+              </a:rPr>
+              <a:t>-dependencies</a:t>
+            </a:r>
+            <a:endParaRPr kumimoji="1" lang="en-US" altLang="ja-JP" sz="1600" dirty="0" smtClean="0">
+              <a:solidFill>
+                <a:schemeClr val="tx1">
+                  <a:lumMod val="75000"/>
+                  <a:lumOff val="25000"/>
+                </a:schemeClr>
+              </a:solidFill>
+            </a:endParaRPr>
+          </a:p>
+        </p:txBody>
+      </p:sp>
+      <p:sp>
+        <p:nvSpPr>
+          <p:cNvPr id="49" name="角丸四角形 48"/>
+          <p:cNvSpPr/>
+          <p:nvPr/>
+        </p:nvSpPr>
+        <p:spPr>
+          <a:xfrm>
+            <a:off x="3085362" y="5746340"/>
+            <a:ext cx="3353754" cy="368242"/>
+          </a:xfrm>
+          <a:prstGeom prst="roundRect">
+            <a:avLst/>
+          </a:prstGeom>
+          <a:gradFill>
+            <a:gsLst>
+              <a:gs pos="0">
+                <a:schemeClr val="bg1">
+                  <a:lumMod val="75000"/>
+                </a:schemeClr>
+              </a:gs>
+              <a:gs pos="100000">
+                <a:schemeClr val="bg1">
+                  <a:lumMod val="95000"/>
+                </a:schemeClr>
+              </a:gs>
+            </a:gsLst>
+          </a:gradFill>
+        </p:spPr>
+        <p:style>
+          <a:lnRef idx="1">
+            <a:schemeClr val="dk1"/>
+          </a:lnRef>
+          <a:fillRef idx="3">
+            <a:schemeClr val="dk1"/>
+          </a:fillRef>
+          <a:effectRef idx="2">
+            <a:schemeClr val="dk1"/>
+          </a:effectRef>
+          <a:fontRef idx="minor">
+            <a:schemeClr val="lt1"/>
+          </a:fontRef>
+        </p:style>
+        <p:txBody>
+          <a:bodyPr rtlCol="0" anchor="ctr"/>
+          <a:lstStyle/>
+          <a:p>
+            <a:pPr algn="ctr"/>
+            <a:r>
+              <a:rPr lang="en-US" altLang="ja-JP" sz="1600" dirty="0" smtClean="0">
+                <a:solidFill>
+                  <a:schemeClr val="tx1">
+                    <a:lumMod val="75000"/>
+                    <a:lumOff val="25000"/>
+                  </a:schemeClr>
+                </a:solidFill>
+              </a:rPr>
+              <a:t>recommended-</a:t>
+            </a:r>
+            <a:r>
+              <a:rPr lang="en-US" altLang="ja-JP" sz="1600" dirty="0" smtClean="0">
+                <a:solidFill>
+                  <a:schemeClr val="tx1">
+                    <a:lumMod val="75000"/>
+                    <a:lumOff val="25000"/>
+                  </a:schemeClr>
+                </a:solidFill>
+              </a:rPr>
+              <a:t>web-</a:t>
+            </a:r>
+            <a:r>
+              <a:rPr lang="en-US" altLang="ja-JP" sz="1600" dirty="0" smtClean="0">
+                <a:solidFill>
+                  <a:schemeClr val="tx1">
+                    <a:lumMod val="75000"/>
+                    <a:lumOff val="25000"/>
+                  </a:schemeClr>
+                </a:solidFill>
+              </a:rPr>
+              <a:t>dependencies</a:t>
+            </a:r>
+            <a:endParaRPr kumimoji="1" lang="en-US" altLang="ja-JP" sz="1600" dirty="0" smtClean="0">
+              <a:solidFill>
+                <a:schemeClr val="tx1">
+                  <a:lumMod val="75000"/>
+                  <a:lumOff val="25000"/>
+                </a:schemeClr>
+              </a:solidFill>
+            </a:endParaRPr>
+          </a:p>
+        </p:txBody>
+      </p:sp>
+      <p:sp>
+        <p:nvSpPr>
+          <p:cNvPr id="50" name="角丸四角形 49"/>
+          <p:cNvSpPr/>
+          <p:nvPr/>
+        </p:nvSpPr>
+        <p:spPr>
+          <a:xfrm>
+            <a:off x="3051778" y="3867662"/>
+            <a:ext cx="3387338" cy="368242"/>
+          </a:xfrm>
+          <a:prstGeom prst="roundRect">
+            <a:avLst/>
+          </a:prstGeom>
+          <a:gradFill>
+            <a:gsLst>
+              <a:gs pos="0">
+                <a:schemeClr val="bg1">
+                  <a:lumMod val="75000"/>
+                </a:schemeClr>
+              </a:gs>
+              <a:gs pos="100000">
+                <a:schemeClr val="bg1">
+                  <a:lumMod val="95000"/>
+                </a:schemeClr>
+              </a:gs>
+            </a:gsLst>
+          </a:gradFill>
+        </p:spPr>
+        <p:style>
+          <a:lnRef idx="1">
+            <a:schemeClr val="dk1"/>
+          </a:lnRef>
+          <a:fillRef idx="3">
+            <a:schemeClr val="dk1"/>
+          </a:fillRef>
+          <a:effectRef idx="2">
+            <a:schemeClr val="dk1"/>
+          </a:effectRef>
+          <a:fontRef idx="minor">
+            <a:schemeClr val="lt1"/>
+          </a:fontRef>
+        </p:style>
+        <p:txBody>
+          <a:bodyPr rtlCol="0" anchor="ctr"/>
+          <a:lstStyle/>
+          <a:p>
+            <a:pPr algn="ctr"/>
+            <a:r>
+              <a:rPr lang="en-US" altLang="ja-JP" sz="1600" dirty="0" smtClean="0">
+                <a:solidFill>
+                  <a:schemeClr val="tx1">
+                    <a:lumMod val="75000"/>
+                    <a:lumOff val="25000"/>
+                  </a:schemeClr>
+                </a:solidFill>
+              </a:rPr>
+              <a:t>mybatis3</a:t>
+            </a:r>
+            <a:endParaRPr kumimoji="1" lang="en-US" altLang="ja-JP" sz="1600" dirty="0" smtClean="0">
+              <a:solidFill>
+                <a:schemeClr val="tx1">
+                  <a:lumMod val="75000"/>
+                  <a:lumOff val="25000"/>
+                </a:schemeClr>
+              </a:solidFill>
+            </a:endParaRPr>
+          </a:p>
+        </p:txBody>
+      </p:sp>
+      <p:sp>
+        <p:nvSpPr>
+          <p:cNvPr id="51" name="角丸四角形 50"/>
+          <p:cNvSpPr/>
+          <p:nvPr/>
+        </p:nvSpPr>
+        <p:spPr>
+          <a:xfrm>
+            <a:off x="3065269" y="4496278"/>
+            <a:ext cx="3387338" cy="368242"/>
+          </a:xfrm>
+          <a:prstGeom prst="roundRect">
+            <a:avLst/>
+          </a:prstGeom>
+          <a:gradFill>
+            <a:gsLst>
+              <a:gs pos="0">
+                <a:schemeClr val="bg1">
+                  <a:lumMod val="75000"/>
+                </a:schemeClr>
+              </a:gs>
+              <a:gs pos="100000">
+                <a:schemeClr val="bg1">
+                  <a:lumMod val="95000"/>
+                </a:schemeClr>
+              </a:gs>
+            </a:gsLst>
+          </a:gradFill>
+        </p:spPr>
+        <p:style>
+          <a:lnRef idx="1">
+            <a:schemeClr val="dk1"/>
+          </a:lnRef>
+          <a:fillRef idx="3">
+            <a:schemeClr val="dk1"/>
+          </a:fillRef>
+          <a:effectRef idx="2">
+            <a:schemeClr val="dk1"/>
+          </a:effectRef>
+          <a:fontRef idx="minor">
+            <a:schemeClr val="lt1"/>
+          </a:fontRef>
+        </p:style>
+        <p:txBody>
+          <a:bodyPr rtlCol="0" anchor="ctr"/>
+          <a:lstStyle/>
+          <a:p>
+            <a:pPr algn="ctr"/>
+            <a:r>
+              <a:rPr kumimoji="1" lang="en-US" altLang="ja-JP" sz="1600" dirty="0" err="1" smtClean="0">
+                <a:solidFill>
+                  <a:schemeClr val="tx1">
+                    <a:lumMod val="75000"/>
+                    <a:lumOff val="25000"/>
+                  </a:schemeClr>
+                </a:solidFill>
+              </a:rPr>
+              <a:t>jpa</a:t>
+            </a:r>
+            <a:endParaRPr kumimoji="1" lang="en-US" altLang="ja-JP" sz="1600" dirty="0" smtClean="0">
+              <a:solidFill>
+                <a:schemeClr val="tx1">
+                  <a:lumMod val="75000"/>
+                  <a:lumOff val="25000"/>
+                </a:schemeClr>
+              </a:solidFill>
+            </a:endParaRPr>
+          </a:p>
+        </p:txBody>
+      </p:sp>
+      <p:sp>
+        <p:nvSpPr>
+          <p:cNvPr id="52" name="角丸四角形 51"/>
+          <p:cNvSpPr/>
+          <p:nvPr/>
+        </p:nvSpPr>
+        <p:spPr>
+          <a:xfrm>
+            <a:off x="3031933" y="1174458"/>
+            <a:ext cx="3387338" cy="368242"/>
+          </a:xfrm>
+          <a:prstGeom prst="roundRect">
+            <a:avLst/>
+          </a:prstGeom>
+          <a:gradFill>
+            <a:gsLst>
+              <a:gs pos="0">
+                <a:schemeClr val="bg1">
+                  <a:lumMod val="75000"/>
+                </a:schemeClr>
+              </a:gs>
+              <a:gs pos="100000">
+                <a:schemeClr val="bg1">
+                  <a:lumMod val="95000"/>
+                </a:schemeClr>
+              </a:gs>
+            </a:gsLst>
+          </a:gradFill>
+        </p:spPr>
+        <p:style>
+          <a:lnRef idx="1">
+            <a:schemeClr val="dk1"/>
+          </a:lnRef>
+          <a:fillRef idx="3">
+            <a:schemeClr val="dk1"/>
+          </a:fillRef>
+          <a:effectRef idx="2">
+            <a:schemeClr val="dk1"/>
+          </a:effectRef>
+          <a:fontRef idx="minor">
+            <a:schemeClr val="lt1"/>
+          </a:fontRef>
+        </p:style>
+        <p:txBody>
+          <a:bodyPr rtlCol="0" anchor="ctr"/>
+          <a:lstStyle/>
+          <a:p>
+            <a:pPr algn="ctr"/>
+            <a:r>
+              <a:rPr lang="en-US" altLang="ja-JP" sz="1600" dirty="0" smtClean="0">
+                <a:solidFill>
+                  <a:schemeClr val="tx1">
+                    <a:lumMod val="75000"/>
+                    <a:lumOff val="25000"/>
+                  </a:schemeClr>
+                </a:solidFill>
+              </a:rPr>
+              <a:t>common</a:t>
+            </a:r>
+            <a:endParaRPr kumimoji="1" lang="en-US" altLang="ja-JP" sz="1600" dirty="0" smtClean="0">
+              <a:solidFill>
+                <a:schemeClr val="tx1">
+                  <a:lumMod val="75000"/>
+                  <a:lumOff val="25000"/>
+                </a:schemeClr>
+              </a:solidFill>
+            </a:endParaRPr>
+          </a:p>
+        </p:txBody>
+      </p:sp>
+      <p:sp>
+        <p:nvSpPr>
+          <p:cNvPr id="53" name="角丸四角形 52"/>
+          <p:cNvSpPr/>
+          <p:nvPr/>
+        </p:nvSpPr>
+        <p:spPr>
+          <a:xfrm>
+            <a:off x="3041856" y="1854640"/>
+            <a:ext cx="3377415" cy="368242"/>
+          </a:xfrm>
+          <a:prstGeom prst="roundRect">
+            <a:avLst/>
+          </a:prstGeom>
+          <a:gradFill>
+            <a:gsLst>
+              <a:gs pos="0">
+                <a:schemeClr val="bg1">
+                  <a:lumMod val="75000"/>
+                </a:schemeClr>
+              </a:gs>
+              <a:gs pos="100000">
+                <a:schemeClr val="bg1">
+                  <a:lumMod val="95000"/>
+                </a:schemeClr>
+              </a:gs>
+            </a:gsLst>
+          </a:gradFill>
+        </p:spPr>
+        <p:style>
+          <a:lnRef idx="1">
+            <a:schemeClr val="dk1"/>
+          </a:lnRef>
+          <a:fillRef idx="3">
+            <a:schemeClr val="dk1"/>
+          </a:fillRef>
+          <a:effectRef idx="2">
+            <a:schemeClr val="dk1"/>
+          </a:effectRef>
+          <a:fontRef idx="minor">
+            <a:schemeClr val="lt1"/>
+          </a:fontRef>
+        </p:style>
+        <p:txBody>
+          <a:bodyPr rtlCol="0" anchor="ctr"/>
+          <a:lstStyle/>
+          <a:p>
+            <a:pPr algn="ctr"/>
+            <a:r>
+              <a:rPr kumimoji="1" lang="en-US" altLang="ja-JP" sz="1600" dirty="0" smtClean="0">
+                <a:solidFill>
+                  <a:schemeClr val="tx1">
+                    <a:lumMod val="75000"/>
+                    <a:lumOff val="25000"/>
+                  </a:schemeClr>
+                </a:solidFill>
+              </a:rPr>
+              <a:t>web</a:t>
+            </a:r>
+            <a:endParaRPr kumimoji="1" lang="en-US" altLang="ja-JP" sz="1600" dirty="0" smtClean="0">
+              <a:solidFill>
+                <a:schemeClr val="tx1">
+                  <a:lumMod val="75000"/>
+                  <a:lumOff val="25000"/>
+                </a:schemeClr>
+              </a:solidFill>
+            </a:endParaRPr>
+          </a:p>
+        </p:txBody>
+      </p:sp>
+      <p:sp>
+        <p:nvSpPr>
+          <p:cNvPr id="55" name="角丸四角形 54"/>
+          <p:cNvSpPr/>
+          <p:nvPr/>
+        </p:nvSpPr>
+        <p:spPr>
+          <a:xfrm>
+            <a:off x="3031934" y="494593"/>
+            <a:ext cx="3387338" cy="368242"/>
+          </a:xfrm>
+          <a:prstGeom prst="roundRect">
+            <a:avLst/>
+          </a:prstGeom>
+          <a:gradFill>
+            <a:gsLst>
+              <a:gs pos="0">
+                <a:schemeClr val="bg1">
+                  <a:lumMod val="75000"/>
+                </a:schemeClr>
+              </a:gs>
+              <a:gs pos="100000">
+                <a:schemeClr val="bg1">
+                  <a:lumMod val="95000"/>
+                </a:schemeClr>
+              </a:gs>
+            </a:gsLst>
+          </a:gradFill>
+        </p:spPr>
+        <p:style>
+          <a:lnRef idx="1">
+            <a:schemeClr val="dk1"/>
+          </a:lnRef>
+          <a:fillRef idx="3">
+            <a:schemeClr val="dk1"/>
+          </a:fillRef>
+          <a:effectRef idx="2">
+            <a:schemeClr val="dk1"/>
+          </a:effectRef>
+          <a:fontRef idx="minor">
+            <a:schemeClr val="lt1"/>
+          </a:fontRef>
+        </p:style>
+        <p:txBody>
+          <a:bodyPr rtlCol="0" anchor="ctr"/>
+          <a:lstStyle/>
+          <a:p>
+            <a:pPr algn="ctr"/>
+            <a:r>
+              <a:rPr kumimoji="1" lang="en-US" altLang="ja-JP" sz="1600" dirty="0" err="1" smtClean="0">
+                <a:solidFill>
+                  <a:schemeClr val="tx1">
+                    <a:lumMod val="75000"/>
+                    <a:lumOff val="25000"/>
+                  </a:schemeClr>
+                </a:solidFill>
+              </a:rPr>
+              <a:t>jodatime</a:t>
+            </a:r>
+            <a:endParaRPr kumimoji="1" lang="en-US" altLang="ja-JP" sz="1600" dirty="0" smtClean="0">
+              <a:solidFill>
+                <a:schemeClr val="tx1">
+                  <a:lumMod val="75000"/>
+                  <a:lumOff val="25000"/>
+                </a:schemeClr>
+              </a:solidFill>
+            </a:endParaRPr>
+          </a:p>
+        </p:txBody>
+      </p:sp>
+      <p:sp>
+        <p:nvSpPr>
+          <p:cNvPr id="56" name="角丸四角形 55"/>
+          <p:cNvSpPr/>
+          <p:nvPr/>
+        </p:nvSpPr>
+        <p:spPr>
+          <a:xfrm>
+            <a:off x="445972" y="3225372"/>
+            <a:ext cx="1339676" cy="368242"/>
+          </a:xfrm>
+          <a:prstGeom prst="roundRect">
+            <a:avLst/>
+          </a:prstGeom>
+          <a:gradFill>
+            <a:gsLst>
+              <a:gs pos="0">
+                <a:schemeClr val="bg1">
+                  <a:lumMod val="75000"/>
+                </a:schemeClr>
+              </a:gs>
+              <a:gs pos="100000">
+                <a:schemeClr val="bg1">
+                  <a:lumMod val="95000"/>
+                </a:schemeClr>
+              </a:gs>
+            </a:gsLst>
+          </a:gradFill>
+        </p:spPr>
+        <p:style>
+          <a:lnRef idx="1">
+            <a:schemeClr val="dk1"/>
+          </a:lnRef>
+          <a:fillRef idx="3">
+            <a:schemeClr val="dk1"/>
+          </a:fillRef>
+          <a:effectRef idx="2">
+            <a:schemeClr val="dk1"/>
+          </a:effectRef>
+          <a:fontRef idx="minor">
+            <a:schemeClr val="lt1"/>
+          </a:fontRef>
+        </p:style>
+        <p:txBody>
+          <a:bodyPr rtlCol="0" anchor="ctr"/>
+          <a:lstStyle/>
+          <a:p>
+            <a:pPr algn="ctr"/>
+            <a:r>
+              <a:rPr kumimoji="1" lang="en-US" altLang="ja-JP" sz="1600" dirty="0" smtClean="0">
+                <a:solidFill>
+                  <a:schemeClr val="tx1">
+                    <a:lumMod val="75000"/>
+                    <a:lumOff val="25000"/>
+                  </a:schemeClr>
+                </a:solidFill>
+              </a:rPr>
+              <a:t>parent</a:t>
+            </a:r>
+            <a:endParaRPr kumimoji="1" lang="en-US" altLang="ja-JP" sz="1600" dirty="0" smtClean="0">
+              <a:solidFill>
+                <a:schemeClr val="tx1">
+                  <a:lumMod val="75000"/>
+                  <a:lumOff val="25000"/>
+                </a:schemeClr>
+              </a:solidFill>
+            </a:endParaRPr>
+          </a:p>
+        </p:txBody>
+      </p:sp>
+      <p:cxnSp>
+        <p:nvCxnSpPr>
+          <p:cNvPr id="3" name="直線コネクタ 2"/>
+          <p:cNvCxnSpPr>
+            <a:stCxn id="47" idx="2"/>
+            <a:endCxn id="46" idx="0"/>
+          </p:cNvCxnSpPr>
+          <p:nvPr/>
+        </p:nvCxnSpPr>
+        <p:spPr>
+          <a:xfrm>
+            <a:off x="4727387" y="2920418"/>
+            <a:ext cx="8138" cy="302824"/>
+          </a:xfrm>
+          <a:prstGeom prst="straightConnector1">
+            <a:avLst/>
+          </a:prstGeom>
+          <a:ln w="12700" cmpd="sng">
+            <a:solidFill>
+              <a:schemeClr val="tx1">
+                <a:lumMod val="50000"/>
+                <a:lumOff val="50000"/>
+              </a:schemeClr>
+            </a:solidFill>
+            <a:prstDash val="sysDash"/>
+            <a:headEnd type="none"/>
+            <a:tailEnd type="arrow"/>
+          </a:ln>
+        </p:spPr>
+        <p:style>
+          <a:lnRef idx="2">
+            <a:schemeClr val="accent1"/>
+          </a:lnRef>
+          <a:fillRef idx="0">
+            <a:schemeClr val="accent1"/>
+          </a:fillRef>
+          <a:effectRef idx="1">
+            <a:schemeClr val="accent1"/>
+          </a:effectRef>
+          <a:fontRef idx="minor">
+            <a:schemeClr val="tx1"/>
+          </a:fontRef>
+        </p:style>
+      </p:cxnSp>
+      <p:cxnSp>
+        <p:nvCxnSpPr>
+          <p:cNvPr id="57" name="直線コネクタ 2"/>
+          <p:cNvCxnSpPr>
+            <a:stCxn id="47" idx="0"/>
+            <a:endCxn id="53" idx="2"/>
+          </p:cNvCxnSpPr>
+          <p:nvPr/>
+        </p:nvCxnSpPr>
+        <p:spPr>
+          <a:xfrm flipV="1">
+            <a:off x="4727387" y="2222882"/>
+            <a:ext cx="3177" cy="329294"/>
+          </a:xfrm>
+          <a:prstGeom prst="straightConnector1">
+            <a:avLst/>
+          </a:prstGeom>
+          <a:ln w="12700" cmpd="sng">
+            <a:solidFill>
+              <a:schemeClr val="tx1">
+                <a:lumMod val="50000"/>
+                <a:lumOff val="50000"/>
+              </a:schemeClr>
+            </a:solidFill>
+            <a:prstDash val="sysDash"/>
+            <a:headEnd type="none"/>
+            <a:tailEnd type="arrow"/>
+          </a:ln>
+        </p:spPr>
+        <p:style>
+          <a:lnRef idx="2">
+            <a:schemeClr val="accent1"/>
+          </a:lnRef>
+          <a:fillRef idx="0">
+            <a:schemeClr val="accent1"/>
+          </a:fillRef>
+          <a:effectRef idx="1">
+            <a:schemeClr val="accent1"/>
+          </a:effectRef>
+          <a:fontRef idx="minor">
+            <a:schemeClr val="tx1"/>
+          </a:fontRef>
+        </p:style>
+      </p:cxnSp>
+      <p:cxnSp>
+        <p:nvCxnSpPr>
+          <p:cNvPr id="65" name="直線コネクタ 2"/>
+          <p:cNvCxnSpPr>
+            <a:stCxn id="55" idx="2"/>
+            <a:endCxn id="52" idx="0"/>
+          </p:cNvCxnSpPr>
+          <p:nvPr/>
+        </p:nvCxnSpPr>
+        <p:spPr>
+          <a:xfrm flipH="1">
+            <a:off x="4725602" y="862835"/>
+            <a:ext cx="1" cy="311623"/>
+          </a:xfrm>
+          <a:prstGeom prst="straightConnector1">
+            <a:avLst/>
+          </a:prstGeom>
+          <a:ln w="12700" cmpd="sng">
+            <a:solidFill>
+              <a:schemeClr val="tx1">
+                <a:lumMod val="50000"/>
+                <a:lumOff val="50000"/>
+              </a:schemeClr>
+            </a:solidFill>
+            <a:prstDash val="sysDash"/>
+            <a:headEnd type="none"/>
+            <a:tailEnd type="arrow"/>
+          </a:ln>
+        </p:spPr>
+        <p:style>
+          <a:lnRef idx="2">
+            <a:schemeClr val="accent1"/>
+          </a:lnRef>
+          <a:fillRef idx="0">
+            <a:schemeClr val="accent1"/>
+          </a:fillRef>
+          <a:effectRef idx="1">
+            <a:schemeClr val="accent1"/>
+          </a:effectRef>
+          <a:fontRef idx="minor">
+            <a:schemeClr val="tx1"/>
+          </a:fontRef>
+        </p:style>
+      </p:cxnSp>
+      <p:cxnSp>
+        <p:nvCxnSpPr>
+          <p:cNvPr id="85" name="直線コネクタ 2"/>
+          <p:cNvCxnSpPr>
+            <a:stCxn id="53" idx="0"/>
+            <a:endCxn id="52" idx="2"/>
+          </p:cNvCxnSpPr>
+          <p:nvPr/>
+        </p:nvCxnSpPr>
+        <p:spPr>
+          <a:xfrm flipH="1" flipV="1">
+            <a:off x="4725602" y="1542700"/>
+            <a:ext cx="4962" cy="311940"/>
+          </a:xfrm>
+          <a:prstGeom prst="straightConnector1">
+            <a:avLst/>
+          </a:prstGeom>
+          <a:ln w="12700" cmpd="sng">
+            <a:solidFill>
+              <a:schemeClr val="tx1">
+                <a:lumMod val="50000"/>
+                <a:lumOff val="50000"/>
+              </a:schemeClr>
+            </a:solidFill>
+            <a:prstDash val="sysDash"/>
+            <a:headEnd type="none"/>
+            <a:tailEnd type="arrow"/>
+          </a:ln>
+        </p:spPr>
+        <p:style>
+          <a:lnRef idx="2">
+            <a:schemeClr val="accent1"/>
+          </a:lnRef>
+          <a:fillRef idx="0">
+            <a:schemeClr val="accent1"/>
+          </a:fillRef>
+          <a:effectRef idx="1">
+            <a:schemeClr val="accent1"/>
+          </a:effectRef>
+          <a:fontRef idx="minor">
+            <a:schemeClr val="tx1"/>
+          </a:fontRef>
+        </p:style>
+      </p:cxnSp>
+      <p:sp>
+        <p:nvSpPr>
+          <p:cNvPr id="88" name="テキスト ボックス 87"/>
+          <p:cNvSpPr txBox="1"/>
+          <p:nvPr/>
+        </p:nvSpPr>
+        <p:spPr>
+          <a:xfrm>
+            <a:off x="4824823" y="866681"/>
+            <a:ext cx="810851" cy="307777"/>
+          </a:xfrm>
+          <a:prstGeom prst="rect">
+            <a:avLst/>
+          </a:prstGeom>
+          <a:noFill/>
+        </p:spPr>
+        <p:txBody>
+          <a:bodyPr wrap="none" rtlCol="0">
+            <a:spAutoFit/>
+          </a:bodyPr>
+          <a:lstStyle/>
+          <a:p>
+            <a:r>
+              <a:rPr kumimoji="1" lang="en-US" altLang="ja-JP" sz="1400" dirty="0" smtClean="0">
+                <a:solidFill>
+                  <a:schemeClr val="tx1">
+                    <a:lumMod val="50000"/>
+                    <a:lumOff val="50000"/>
+                  </a:schemeClr>
+                </a:solidFill>
+              </a:rPr>
+              <a:t>depends</a:t>
+            </a:r>
+            <a:endParaRPr kumimoji="1" lang="ja-JP" altLang="en-US" sz="1400" dirty="0">
+              <a:solidFill>
+                <a:schemeClr val="tx1">
+                  <a:lumMod val="50000"/>
+                  <a:lumOff val="50000"/>
+                </a:schemeClr>
+              </a:solidFill>
+            </a:endParaRPr>
+          </a:p>
+        </p:txBody>
+      </p:sp>
+      <p:sp>
+        <p:nvSpPr>
+          <p:cNvPr id="91" name="テキスト ボックス 90"/>
+          <p:cNvSpPr txBox="1"/>
+          <p:nvPr/>
+        </p:nvSpPr>
+        <p:spPr>
+          <a:xfrm>
+            <a:off x="4825031" y="1539898"/>
+            <a:ext cx="810851" cy="307777"/>
+          </a:xfrm>
+          <a:prstGeom prst="rect">
+            <a:avLst/>
+          </a:prstGeom>
+          <a:noFill/>
+        </p:spPr>
+        <p:txBody>
+          <a:bodyPr wrap="none" rtlCol="0">
+            <a:spAutoFit/>
+          </a:bodyPr>
+          <a:lstStyle/>
+          <a:p>
+            <a:r>
+              <a:rPr kumimoji="1" lang="en-US" altLang="ja-JP" sz="1400" dirty="0" smtClean="0">
+                <a:solidFill>
+                  <a:schemeClr val="tx1">
+                    <a:lumMod val="50000"/>
+                    <a:lumOff val="50000"/>
+                  </a:schemeClr>
+                </a:solidFill>
+              </a:rPr>
+              <a:t>depends</a:t>
+            </a:r>
+            <a:endParaRPr kumimoji="1" lang="ja-JP" altLang="en-US" sz="1400" dirty="0">
+              <a:solidFill>
+                <a:schemeClr val="tx1">
+                  <a:lumMod val="50000"/>
+                  <a:lumOff val="50000"/>
+                </a:schemeClr>
+              </a:solidFill>
+            </a:endParaRPr>
+          </a:p>
+        </p:txBody>
+      </p:sp>
+      <p:sp>
+        <p:nvSpPr>
+          <p:cNvPr id="92" name="テキスト ボックス 91"/>
+          <p:cNvSpPr txBox="1"/>
+          <p:nvPr/>
+        </p:nvSpPr>
+        <p:spPr>
+          <a:xfrm>
+            <a:off x="4824823" y="2222882"/>
+            <a:ext cx="810851" cy="307777"/>
+          </a:xfrm>
+          <a:prstGeom prst="rect">
+            <a:avLst/>
+          </a:prstGeom>
+          <a:noFill/>
+        </p:spPr>
+        <p:txBody>
+          <a:bodyPr wrap="none" rtlCol="0">
+            <a:spAutoFit/>
+          </a:bodyPr>
+          <a:lstStyle/>
+          <a:p>
+            <a:r>
+              <a:rPr kumimoji="1" lang="en-US" altLang="ja-JP" sz="1400" dirty="0" smtClean="0">
+                <a:solidFill>
+                  <a:schemeClr val="tx1">
+                    <a:lumMod val="50000"/>
+                    <a:lumOff val="50000"/>
+                  </a:schemeClr>
+                </a:solidFill>
+              </a:rPr>
+              <a:t>depends</a:t>
+            </a:r>
+            <a:endParaRPr kumimoji="1" lang="ja-JP" altLang="en-US" sz="1400" dirty="0">
+              <a:solidFill>
+                <a:schemeClr val="tx1">
+                  <a:lumMod val="50000"/>
+                  <a:lumOff val="50000"/>
+                </a:schemeClr>
+              </a:solidFill>
+            </a:endParaRPr>
+          </a:p>
+        </p:txBody>
+      </p:sp>
+      <p:sp>
+        <p:nvSpPr>
+          <p:cNvPr id="93" name="テキスト ボックス 92"/>
+          <p:cNvSpPr txBox="1"/>
+          <p:nvPr/>
+        </p:nvSpPr>
+        <p:spPr>
+          <a:xfrm>
+            <a:off x="4835161" y="2883736"/>
+            <a:ext cx="810851" cy="307777"/>
+          </a:xfrm>
+          <a:prstGeom prst="rect">
+            <a:avLst/>
+          </a:prstGeom>
+          <a:noFill/>
+        </p:spPr>
+        <p:txBody>
+          <a:bodyPr wrap="none" rtlCol="0">
+            <a:spAutoFit/>
+          </a:bodyPr>
+          <a:lstStyle/>
+          <a:p>
+            <a:r>
+              <a:rPr kumimoji="1" lang="en-US" altLang="ja-JP" sz="1400" dirty="0" smtClean="0">
+                <a:solidFill>
+                  <a:schemeClr val="tx1">
+                    <a:lumMod val="50000"/>
+                    <a:lumOff val="50000"/>
+                  </a:schemeClr>
+                </a:solidFill>
+              </a:rPr>
+              <a:t>depends</a:t>
+            </a:r>
+            <a:endParaRPr kumimoji="1" lang="ja-JP" altLang="en-US" sz="1400" dirty="0">
+              <a:solidFill>
+                <a:schemeClr val="tx1">
+                  <a:lumMod val="50000"/>
+                  <a:lumOff val="50000"/>
+                </a:schemeClr>
+              </a:solidFill>
+            </a:endParaRPr>
+          </a:p>
+        </p:txBody>
+      </p:sp>
+      <p:cxnSp>
+        <p:nvCxnSpPr>
+          <p:cNvPr id="94" name="直線コネクタ 2"/>
+          <p:cNvCxnSpPr>
+            <a:stCxn id="55" idx="1"/>
+            <a:endCxn id="56" idx="3"/>
+          </p:cNvCxnSpPr>
+          <p:nvPr/>
+        </p:nvCxnSpPr>
+        <p:spPr>
+          <a:xfrm flipH="1">
+            <a:off x="1785648" y="678714"/>
+            <a:ext cx="1246286" cy="2730779"/>
+          </a:xfrm>
+          <a:prstGeom prst="straightConnector1">
+            <a:avLst/>
+          </a:prstGeom>
+          <a:ln w="12700" cmpd="sng">
+            <a:solidFill>
+              <a:schemeClr val="tx1">
+                <a:lumMod val="50000"/>
+                <a:lumOff val="50000"/>
+              </a:schemeClr>
+            </a:solidFill>
+            <a:prstDash val="solid"/>
+            <a:headEnd type="none"/>
+            <a:tailEnd type="none"/>
+          </a:ln>
+        </p:spPr>
+        <p:style>
+          <a:lnRef idx="2">
+            <a:schemeClr val="accent1"/>
+          </a:lnRef>
+          <a:fillRef idx="0">
+            <a:schemeClr val="accent1"/>
+          </a:fillRef>
+          <a:effectRef idx="1">
+            <a:schemeClr val="accent1"/>
+          </a:effectRef>
+          <a:fontRef idx="minor">
+            <a:schemeClr val="tx1"/>
+          </a:fontRef>
+        </p:style>
+      </p:cxnSp>
+      <p:cxnSp>
+        <p:nvCxnSpPr>
+          <p:cNvPr id="96" name="直線コネクタ 2"/>
+          <p:cNvCxnSpPr>
+            <a:stCxn id="52" idx="1"/>
+            <a:endCxn id="56" idx="3"/>
+          </p:cNvCxnSpPr>
+          <p:nvPr/>
+        </p:nvCxnSpPr>
+        <p:spPr>
+          <a:xfrm flipH="1">
+            <a:off x="1785648" y="1358579"/>
+            <a:ext cx="1246285" cy="2050914"/>
+          </a:xfrm>
+          <a:prstGeom prst="straightConnector1">
+            <a:avLst/>
+          </a:prstGeom>
+          <a:ln w="12700" cmpd="sng">
+            <a:solidFill>
+              <a:schemeClr val="tx1">
+                <a:lumMod val="50000"/>
+                <a:lumOff val="50000"/>
+              </a:schemeClr>
+            </a:solidFill>
+            <a:prstDash val="solid"/>
+            <a:headEnd type="none"/>
+            <a:tailEnd type="none"/>
+          </a:ln>
+        </p:spPr>
+        <p:style>
+          <a:lnRef idx="2">
+            <a:schemeClr val="accent1"/>
+          </a:lnRef>
+          <a:fillRef idx="0">
+            <a:schemeClr val="accent1"/>
+          </a:fillRef>
+          <a:effectRef idx="1">
+            <a:schemeClr val="accent1"/>
+          </a:effectRef>
+          <a:fontRef idx="minor">
+            <a:schemeClr val="tx1"/>
+          </a:fontRef>
+        </p:style>
+      </p:cxnSp>
+      <p:cxnSp>
+        <p:nvCxnSpPr>
+          <p:cNvPr id="99" name="直線コネクタ 2"/>
+          <p:cNvCxnSpPr>
+            <a:stCxn id="53" idx="1"/>
+            <a:endCxn id="56" idx="3"/>
+          </p:cNvCxnSpPr>
+          <p:nvPr/>
+        </p:nvCxnSpPr>
+        <p:spPr>
+          <a:xfrm flipH="1">
+            <a:off x="1785648" y="2038761"/>
+            <a:ext cx="1256208" cy="1370732"/>
+          </a:xfrm>
+          <a:prstGeom prst="straightConnector1">
+            <a:avLst/>
+          </a:prstGeom>
+          <a:ln w="12700" cmpd="sng">
+            <a:solidFill>
+              <a:schemeClr val="tx1">
+                <a:lumMod val="50000"/>
+                <a:lumOff val="50000"/>
+              </a:schemeClr>
+            </a:solidFill>
+            <a:prstDash val="solid"/>
+            <a:headEnd type="none"/>
+            <a:tailEnd type="none"/>
+          </a:ln>
+        </p:spPr>
+        <p:style>
+          <a:lnRef idx="2">
+            <a:schemeClr val="accent1"/>
+          </a:lnRef>
+          <a:fillRef idx="0">
+            <a:schemeClr val="accent1"/>
+          </a:fillRef>
+          <a:effectRef idx="1">
+            <a:schemeClr val="accent1"/>
+          </a:effectRef>
+          <a:fontRef idx="minor">
+            <a:schemeClr val="tx1"/>
+          </a:fontRef>
+        </p:style>
+      </p:cxnSp>
+      <p:cxnSp>
+        <p:nvCxnSpPr>
+          <p:cNvPr id="102" name="直線コネクタ 2"/>
+          <p:cNvCxnSpPr>
+            <a:stCxn id="47" idx="1"/>
+            <a:endCxn id="56" idx="3"/>
+          </p:cNvCxnSpPr>
+          <p:nvPr/>
+        </p:nvCxnSpPr>
+        <p:spPr>
+          <a:xfrm flipH="1">
+            <a:off x="1785648" y="2736297"/>
+            <a:ext cx="1259777" cy="673196"/>
+          </a:xfrm>
+          <a:prstGeom prst="straightConnector1">
+            <a:avLst/>
+          </a:prstGeom>
+          <a:ln w="12700" cmpd="sng">
+            <a:solidFill>
+              <a:schemeClr val="tx1">
+                <a:lumMod val="50000"/>
+                <a:lumOff val="50000"/>
+              </a:schemeClr>
+            </a:solidFill>
+            <a:prstDash val="solid"/>
+            <a:headEnd type="none"/>
+            <a:tailEnd type="none"/>
+          </a:ln>
+        </p:spPr>
+        <p:style>
+          <a:lnRef idx="2">
+            <a:schemeClr val="accent1"/>
+          </a:lnRef>
+          <a:fillRef idx="0">
+            <a:schemeClr val="accent1"/>
+          </a:fillRef>
+          <a:effectRef idx="1">
+            <a:schemeClr val="accent1"/>
+          </a:effectRef>
+          <a:fontRef idx="minor">
+            <a:schemeClr val="tx1"/>
+          </a:fontRef>
+        </p:style>
+      </p:cxnSp>
+      <p:cxnSp>
+        <p:nvCxnSpPr>
+          <p:cNvPr id="105" name="直線コネクタ 2"/>
+          <p:cNvCxnSpPr>
+            <a:stCxn id="46" idx="1"/>
+            <a:endCxn id="56" idx="3"/>
+          </p:cNvCxnSpPr>
+          <p:nvPr/>
+        </p:nvCxnSpPr>
+        <p:spPr>
+          <a:xfrm flipH="1">
+            <a:off x="1785648" y="3407363"/>
+            <a:ext cx="1256208" cy="2130"/>
+          </a:xfrm>
+          <a:prstGeom prst="straightConnector1">
+            <a:avLst/>
+          </a:prstGeom>
+          <a:ln w="12700" cmpd="sng">
+            <a:solidFill>
+              <a:schemeClr val="tx1">
+                <a:lumMod val="50000"/>
+                <a:lumOff val="50000"/>
+              </a:schemeClr>
+            </a:solidFill>
+            <a:prstDash val="solid"/>
+            <a:headEnd type="none"/>
+            <a:tailEnd type="none"/>
+          </a:ln>
+        </p:spPr>
+        <p:style>
+          <a:lnRef idx="2">
+            <a:schemeClr val="accent1"/>
+          </a:lnRef>
+          <a:fillRef idx="0">
+            <a:schemeClr val="accent1"/>
+          </a:fillRef>
+          <a:effectRef idx="1">
+            <a:schemeClr val="accent1"/>
+          </a:effectRef>
+          <a:fontRef idx="minor">
+            <a:schemeClr val="tx1"/>
+          </a:fontRef>
+        </p:style>
+      </p:cxnSp>
+      <p:cxnSp>
+        <p:nvCxnSpPr>
+          <p:cNvPr id="108" name="直線コネクタ 2"/>
+          <p:cNvCxnSpPr>
+            <a:stCxn id="50" idx="1"/>
+            <a:endCxn id="56" idx="3"/>
+          </p:cNvCxnSpPr>
+          <p:nvPr/>
+        </p:nvCxnSpPr>
+        <p:spPr>
+          <a:xfrm flipH="1" flipV="1">
+            <a:off x="1785648" y="3409493"/>
+            <a:ext cx="1266130" cy="642290"/>
+          </a:xfrm>
+          <a:prstGeom prst="straightConnector1">
+            <a:avLst/>
+          </a:prstGeom>
+          <a:ln w="12700" cmpd="sng">
+            <a:solidFill>
+              <a:schemeClr val="tx1">
+                <a:lumMod val="50000"/>
+                <a:lumOff val="50000"/>
+              </a:schemeClr>
+            </a:solidFill>
+            <a:prstDash val="solid"/>
+            <a:headEnd type="none"/>
+            <a:tailEnd type="none"/>
+          </a:ln>
+        </p:spPr>
+        <p:style>
+          <a:lnRef idx="2">
+            <a:schemeClr val="accent1"/>
+          </a:lnRef>
+          <a:fillRef idx="0">
+            <a:schemeClr val="accent1"/>
+          </a:fillRef>
+          <a:effectRef idx="1">
+            <a:schemeClr val="accent1"/>
+          </a:effectRef>
+          <a:fontRef idx="minor">
+            <a:schemeClr val="tx1"/>
+          </a:fontRef>
+        </p:style>
+      </p:cxnSp>
+      <p:cxnSp>
+        <p:nvCxnSpPr>
+          <p:cNvPr id="111" name="直線コネクタ 2"/>
+          <p:cNvCxnSpPr>
+            <a:stCxn id="51" idx="1"/>
+            <a:endCxn id="56" idx="3"/>
+          </p:cNvCxnSpPr>
+          <p:nvPr/>
+        </p:nvCxnSpPr>
+        <p:spPr>
+          <a:xfrm flipH="1" flipV="1">
+            <a:off x="1785648" y="3409493"/>
+            <a:ext cx="1279621" cy="1270906"/>
+          </a:xfrm>
+          <a:prstGeom prst="straightConnector1">
+            <a:avLst/>
+          </a:prstGeom>
+          <a:ln w="12700" cmpd="sng">
+            <a:solidFill>
+              <a:schemeClr val="tx1">
+                <a:lumMod val="50000"/>
+                <a:lumOff val="50000"/>
+              </a:schemeClr>
+            </a:solidFill>
+            <a:prstDash val="solid"/>
+            <a:headEnd type="none"/>
+            <a:tailEnd type="none"/>
+          </a:ln>
+        </p:spPr>
+        <p:style>
+          <a:lnRef idx="2">
+            <a:schemeClr val="accent1"/>
+          </a:lnRef>
+          <a:fillRef idx="0">
+            <a:schemeClr val="accent1"/>
+          </a:fillRef>
+          <a:effectRef idx="1">
+            <a:schemeClr val="accent1"/>
+          </a:effectRef>
+          <a:fontRef idx="minor">
+            <a:schemeClr val="tx1"/>
+          </a:fontRef>
+        </p:style>
+      </p:cxnSp>
+      <p:cxnSp>
+        <p:nvCxnSpPr>
+          <p:cNvPr id="115" name="直線コネクタ 2"/>
+          <p:cNvCxnSpPr>
+            <a:stCxn id="48" idx="1"/>
+            <a:endCxn id="56" idx="3"/>
+          </p:cNvCxnSpPr>
+          <p:nvPr/>
+        </p:nvCxnSpPr>
+        <p:spPr>
+          <a:xfrm flipH="1" flipV="1">
+            <a:off x="1785648" y="3409493"/>
+            <a:ext cx="1289543" cy="1881274"/>
+          </a:xfrm>
+          <a:prstGeom prst="straightConnector1">
+            <a:avLst/>
+          </a:prstGeom>
+          <a:ln w="12700" cmpd="sng">
+            <a:solidFill>
+              <a:schemeClr val="tx1">
+                <a:lumMod val="50000"/>
+                <a:lumOff val="50000"/>
+              </a:schemeClr>
+            </a:solidFill>
+            <a:prstDash val="solid"/>
+            <a:headEnd type="none"/>
+            <a:tailEnd type="none"/>
+          </a:ln>
+        </p:spPr>
+        <p:style>
+          <a:lnRef idx="2">
+            <a:schemeClr val="accent1"/>
+          </a:lnRef>
+          <a:fillRef idx="0">
+            <a:schemeClr val="accent1"/>
+          </a:fillRef>
+          <a:effectRef idx="1">
+            <a:schemeClr val="accent1"/>
+          </a:effectRef>
+          <a:fontRef idx="minor">
+            <a:schemeClr val="tx1"/>
+          </a:fontRef>
+        </p:style>
+      </p:cxnSp>
+      <p:cxnSp>
+        <p:nvCxnSpPr>
+          <p:cNvPr id="118" name="直線コネクタ 2"/>
+          <p:cNvCxnSpPr>
+            <a:stCxn id="49" idx="1"/>
+            <a:endCxn id="56" idx="3"/>
+          </p:cNvCxnSpPr>
+          <p:nvPr/>
+        </p:nvCxnSpPr>
+        <p:spPr>
+          <a:xfrm flipH="1" flipV="1">
+            <a:off x="1785648" y="3409493"/>
+            <a:ext cx="1299714" cy="2520968"/>
+          </a:xfrm>
+          <a:prstGeom prst="straightConnector1">
+            <a:avLst/>
+          </a:prstGeom>
+          <a:ln w="12700" cmpd="sng">
+            <a:solidFill>
+              <a:schemeClr val="tx1">
+                <a:lumMod val="50000"/>
+                <a:lumOff val="50000"/>
+              </a:schemeClr>
+            </a:solidFill>
+            <a:prstDash val="solid"/>
+            <a:headEnd type="none"/>
+            <a:tailEnd type="none"/>
+          </a:ln>
+        </p:spPr>
+        <p:style>
+          <a:lnRef idx="2">
+            <a:schemeClr val="accent1"/>
+          </a:lnRef>
+          <a:fillRef idx="0">
+            <a:schemeClr val="accent1"/>
+          </a:fillRef>
+          <a:effectRef idx="1">
+            <a:schemeClr val="accent1"/>
+          </a:effectRef>
+          <a:fontRef idx="minor">
+            <a:schemeClr val="tx1"/>
+          </a:fontRef>
+        </p:style>
+      </p:cxnSp>
+      <p:sp>
+        <p:nvSpPr>
+          <p:cNvPr id="121" name="テキスト ボックス 120"/>
+          <p:cNvSpPr txBox="1"/>
+          <p:nvPr/>
+        </p:nvSpPr>
+        <p:spPr>
+          <a:xfrm>
+            <a:off x="2181394" y="3109821"/>
+            <a:ext cx="671378" cy="307777"/>
+          </a:xfrm>
+          <a:prstGeom prst="rect">
+            <a:avLst/>
+          </a:prstGeom>
+          <a:noFill/>
+        </p:spPr>
+        <p:txBody>
+          <a:bodyPr wrap="none" rtlCol="0">
+            <a:spAutoFit/>
+          </a:bodyPr>
+          <a:lstStyle/>
+          <a:p>
+            <a:r>
+              <a:rPr kumimoji="1" lang="en-US" altLang="ja-JP" sz="1400" dirty="0" smtClean="0">
+                <a:solidFill>
+                  <a:schemeClr val="tx1">
+                    <a:lumMod val="50000"/>
+                    <a:lumOff val="50000"/>
+                  </a:schemeClr>
+                </a:solidFill>
+              </a:rPr>
+              <a:t>parent</a:t>
+            </a:r>
+            <a:endParaRPr kumimoji="1" lang="ja-JP" altLang="en-US" sz="1400" dirty="0">
+              <a:solidFill>
+                <a:schemeClr val="tx1">
+                  <a:lumMod val="50000"/>
+                  <a:lumOff val="50000"/>
+                </a:schemeClr>
+              </a:solidFill>
+            </a:endParaRPr>
+          </a:p>
+        </p:txBody>
+      </p:sp>
+      <p:sp>
+        <p:nvSpPr>
+          <p:cNvPr id="122" name="右中かっこ 121"/>
+          <p:cNvSpPr/>
+          <p:nvPr/>
+        </p:nvSpPr>
+        <p:spPr>
+          <a:xfrm>
+            <a:off x="6647465" y="494593"/>
+            <a:ext cx="367100" cy="2501597"/>
+          </a:xfrm>
+          <a:prstGeom prst="rightBrace">
+            <a:avLst/>
+          </a:prstGeom>
+          <a:ln>
+            <a:solidFill>
+              <a:srgbClr val="7F7F7F"/>
+            </a:solidFill>
+          </a:ln>
+        </p:spPr>
+        <p:style>
+          <a:lnRef idx="2">
+            <a:schemeClr val="accent1"/>
+          </a:lnRef>
+          <a:fillRef idx="0">
+            <a:schemeClr val="accent1"/>
+          </a:fillRef>
+          <a:effectRef idx="1">
+            <a:schemeClr val="accent1"/>
+          </a:effectRef>
+          <a:fontRef idx="minor">
+            <a:schemeClr val="tx1"/>
+          </a:fontRef>
+        </p:style>
+        <p:txBody>
+          <a:bodyPr rtlCol="0" anchor="ctr"/>
+          <a:lstStyle/>
+          <a:p>
+            <a:pPr algn="ctr"/>
+            <a:endParaRPr kumimoji="1" lang="ja-JP" altLang="en-US"/>
+          </a:p>
+        </p:txBody>
+      </p:sp>
+      <p:sp>
+        <p:nvSpPr>
+          <p:cNvPr id="123" name="右中かっこ 122"/>
+          <p:cNvSpPr/>
+          <p:nvPr/>
+        </p:nvSpPr>
+        <p:spPr>
+          <a:xfrm>
+            <a:off x="6677229" y="3211355"/>
+            <a:ext cx="367100" cy="2923069"/>
+          </a:xfrm>
+          <a:prstGeom prst="rightBrace">
+            <a:avLst/>
+          </a:prstGeom>
+          <a:ln>
+            <a:solidFill>
+              <a:srgbClr val="7F7F7F"/>
+            </a:solidFill>
+          </a:ln>
+        </p:spPr>
+        <p:style>
+          <a:lnRef idx="2">
+            <a:schemeClr val="accent1"/>
+          </a:lnRef>
+          <a:fillRef idx="0">
+            <a:schemeClr val="accent1"/>
+          </a:fillRef>
+          <a:effectRef idx="1">
+            <a:schemeClr val="accent1"/>
+          </a:effectRef>
+          <a:fontRef idx="minor">
+            <a:schemeClr val="tx1"/>
+          </a:fontRef>
+        </p:style>
+        <p:txBody>
+          <a:bodyPr rtlCol="0" anchor="ctr"/>
+          <a:lstStyle/>
+          <a:p>
+            <a:pPr algn="ctr"/>
+            <a:endParaRPr kumimoji="1" lang="ja-JP" altLang="en-US"/>
+          </a:p>
+        </p:txBody>
+      </p:sp>
+      <p:sp>
+        <p:nvSpPr>
+          <p:cNvPr id="124" name="テキスト ボックス 123"/>
+          <p:cNvSpPr txBox="1"/>
+          <p:nvPr/>
+        </p:nvSpPr>
+        <p:spPr>
+          <a:xfrm>
+            <a:off x="6905423" y="1171368"/>
+            <a:ext cx="1595011" cy="1200329"/>
+          </a:xfrm>
+          <a:prstGeom prst="rect">
+            <a:avLst/>
+          </a:prstGeom>
+          <a:noFill/>
+        </p:spPr>
+        <p:txBody>
+          <a:bodyPr wrap="square" rtlCol="0">
+            <a:spAutoFit/>
+          </a:bodyPr>
+          <a:lstStyle/>
+          <a:p>
+            <a:pPr algn="ctr"/>
+            <a:r>
+              <a:rPr lang="en-US" altLang="ja-JP" dirty="0" smtClean="0">
+                <a:solidFill>
+                  <a:schemeClr val="tx1">
+                    <a:lumMod val="65000"/>
+                    <a:lumOff val="35000"/>
+                  </a:schemeClr>
+                </a:solidFill>
+              </a:rPr>
+              <a:t>Provide</a:t>
+            </a:r>
+            <a:endParaRPr kumimoji="1" lang="en-US" altLang="ja-JP" dirty="0" smtClean="0">
+              <a:solidFill>
+                <a:schemeClr val="tx1">
+                  <a:lumMod val="65000"/>
+                  <a:lumOff val="35000"/>
+                </a:schemeClr>
+              </a:solidFill>
+            </a:endParaRPr>
+          </a:p>
+          <a:p>
+            <a:pPr algn="ctr"/>
+            <a:r>
+              <a:rPr lang="en-US" altLang="ja-JP" dirty="0">
+                <a:solidFill>
+                  <a:schemeClr val="tx1">
+                    <a:lumMod val="65000"/>
+                    <a:lumOff val="35000"/>
+                  </a:schemeClr>
+                </a:solidFill>
+              </a:rPr>
+              <a:t>c</a:t>
+            </a:r>
+            <a:r>
+              <a:rPr kumimoji="1" lang="en-US" altLang="ja-JP" dirty="0" smtClean="0">
+                <a:solidFill>
+                  <a:schemeClr val="tx1">
+                    <a:lumMod val="65000"/>
+                    <a:lumOff val="35000"/>
+                  </a:schemeClr>
+                </a:solidFill>
+              </a:rPr>
+              <a:t>lasses</a:t>
+            </a:r>
+          </a:p>
+          <a:p>
+            <a:pPr algn="ctr"/>
+            <a:r>
+              <a:rPr kumimoji="1" lang="en-US" altLang="ja-JP" dirty="0" smtClean="0">
+                <a:solidFill>
+                  <a:schemeClr val="tx1">
+                    <a:lumMod val="65000"/>
+                    <a:lumOff val="35000"/>
+                  </a:schemeClr>
+                </a:solidFill>
+              </a:rPr>
+              <a:t>&amp;</a:t>
+            </a:r>
+          </a:p>
+          <a:p>
+            <a:pPr algn="ctr"/>
+            <a:r>
+              <a:rPr lang="en-US" altLang="ja-JP" dirty="0" smtClean="0">
+                <a:solidFill>
+                  <a:schemeClr val="tx1">
+                    <a:lumMod val="65000"/>
+                    <a:lumOff val="35000"/>
+                  </a:schemeClr>
+                </a:solidFill>
+              </a:rPr>
+              <a:t>dependencies</a:t>
+            </a:r>
+            <a:endParaRPr kumimoji="1" lang="ja-JP" altLang="en-US" dirty="0">
+              <a:solidFill>
+                <a:schemeClr val="tx1">
+                  <a:lumMod val="65000"/>
+                  <a:lumOff val="35000"/>
+                </a:schemeClr>
+              </a:solidFill>
+            </a:endParaRPr>
+          </a:p>
+        </p:txBody>
+      </p:sp>
+      <p:sp>
+        <p:nvSpPr>
+          <p:cNvPr id="125" name="テキスト ボックス 124"/>
+          <p:cNvSpPr txBox="1"/>
+          <p:nvPr/>
+        </p:nvSpPr>
+        <p:spPr>
+          <a:xfrm>
+            <a:off x="6918913" y="4406989"/>
+            <a:ext cx="1492716" cy="646331"/>
+          </a:xfrm>
+          <a:prstGeom prst="rect">
+            <a:avLst/>
+          </a:prstGeom>
+          <a:noFill/>
+        </p:spPr>
+        <p:txBody>
+          <a:bodyPr wrap="none" rtlCol="0">
+            <a:spAutoFit/>
+          </a:bodyPr>
+          <a:lstStyle/>
+          <a:p>
+            <a:pPr algn="ctr"/>
+            <a:r>
+              <a:rPr lang="en-US" altLang="ja-JP" dirty="0" smtClean="0">
+                <a:solidFill>
+                  <a:schemeClr val="tx1">
+                    <a:lumMod val="65000"/>
+                    <a:lumOff val="35000"/>
+                  </a:schemeClr>
+                </a:solidFill>
+              </a:rPr>
+              <a:t>Provide</a:t>
+            </a:r>
+          </a:p>
+          <a:p>
+            <a:pPr algn="ctr"/>
+            <a:r>
+              <a:rPr lang="en-US" altLang="ja-JP" dirty="0">
+                <a:solidFill>
+                  <a:schemeClr val="tx1">
+                    <a:lumMod val="65000"/>
+                    <a:lumOff val="35000"/>
+                  </a:schemeClr>
+                </a:solidFill>
+              </a:rPr>
+              <a:t>d</a:t>
+            </a:r>
+            <a:r>
+              <a:rPr lang="en-US" altLang="ja-JP" dirty="0" smtClean="0">
+                <a:solidFill>
+                  <a:schemeClr val="tx1">
+                    <a:lumMod val="65000"/>
+                    <a:lumOff val="35000"/>
+                  </a:schemeClr>
+                </a:solidFill>
+              </a:rPr>
+              <a:t>ependencies</a:t>
+            </a:r>
+            <a:endParaRPr kumimoji="1" lang="ja-JP" altLang="en-US" dirty="0">
+              <a:solidFill>
+                <a:schemeClr val="tx1">
+                  <a:lumMod val="65000"/>
+                  <a:lumOff val="35000"/>
+                </a:schemeClr>
+              </a:solidFill>
+            </a:endParaRPr>
+          </a:p>
+        </p:txBody>
+      </p:sp>
+    </p:spTree>
+    <p:extLst>
+      <p:ext uri="{BB962C8B-B14F-4D97-AF65-F5344CB8AC3E}">
+        <p14:creationId xmlns:p14="http://schemas.microsoft.com/office/powerpoint/2010/main" val="399619677"/>
+      </p:ext>
+    </p:extLst>
+  </p:cSld>
+  <p:clrMapOvr>
+    <a:masterClrMapping/>
+  </p:clrMapOvr>
+  <p:timing>
+    <p:tnLst>
+      <p:par>
+        <p:cTn xmlns:p14="http://schemas.microsoft.com/office/powerpoint/2010/main" id="1" dur="indefinite" restart="never" nodeType="tmRoot"/>
       </p:par>
     </p:tnLst>
   </p:timing>

</xml_diff>